<commit_message>
All patterns but REST
</commit_message>
<xml_diff>
--- a/Record_cards/cards.pptx
+++ b/Record_cards/cards.pptx
@@ -5,11 +5,21 @@
     <p:sldMasterId id="2147483648" r:id="rId1"/>
   </p:sldMasterIdLst>
   <p:notesMasterIdLst>
-    <p:notesMasterId r:id="rId4"/>
+    <p:notesMasterId r:id="rId14"/>
   </p:notesMasterIdLst>
   <p:sldIdLst>
     <p:sldId id="258" r:id="rId2"/>
-    <p:sldId id="259" r:id="rId3"/>
+    <p:sldId id="267" r:id="rId3"/>
+    <p:sldId id="259" r:id="rId4"/>
+    <p:sldId id="260" r:id="rId5"/>
+    <p:sldId id="261" r:id="rId6"/>
+    <p:sldId id="262" r:id="rId7"/>
+    <p:sldId id="271" r:id="rId8"/>
+    <p:sldId id="264" r:id="rId9"/>
+    <p:sldId id="265" r:id="rId10"/>
+    <p:sldId id="268" r:id="rId11"/>
+    <p:sldId id="272" r:id="rId12"/>
+    <p:sldId id="270" r:id="rId13"/>
   </p:sldIdLst>
   <p:sldSz cx="12192000" cy="6858000"/>
   <p:notesSz cx="6858000" cy="9144000"/>
@@ -109,6 +119,34 @@
     </a:lvl9pPr>
   </p:defaultTextStyle>
   <p:extLst>
+    <p:ext uri="{521415D9-36F7-43E2-AB2F-B90AF26B5E84}">
+      <p14:sectionLst xmlns:p14="http://schemas.microsoft.com/office/powerpoint/2010/main">
+        <p14:section name="Standardabschnitt" id="{4142F820-8D35-4417-BE11-9BB5BCD087A3}">
+          <p14:sldIdLst>
+            <p14:sldId id="258"/>
+          </p14:sldIdLst>
+        </p14:section>
+        <p14:section name="Design Patterns" id="{2AD640BA-E128-4226-8200-04F20B74EFD0}">
+          <p14:sldIdLst>
+            <p14:sldId id="267"/>
+            <p14:sldId id="259"/>
+            <p14:sldId id="260"/>
+            <p14:sldId id="261"/>
+            <p14:sldId id="262"/>
+            <p14:sldId id="271"/>
+            <p14:sldId id="264"/>
+            <p14:sldId id="265"/>
+          </p14:sldIdLst>
+        </p14:section>
+        <p14:section name="Behavioral Patterns" id="{85D3A59F-DA07-4855-95AA-84205331254D}">
+          <p14:sldIdLst>
+            <p14:sldId id="268"/>
+            <p14:sldId id="272"/>
+            <p14:sldId id="270"/>
+          </p14:sldIdLst>
+        </p14:section>
+      </p14:sectionLst>
+    </p:ext>
     <p:ext uri="{EFAFB233-063F-42B5-8137-9DF3F51BA10A}">
       <p15:sldGuideLst xmlns:p15="http://schemas.microsoft.com/office/powerpoint/2012/main">
         <p15:guide id="1" orient="horz" pos="2069" userDrawn="1">
@@ -125,6 +163,10 @@
     </p:ext>
   </p:extLst>
 </p:presentation>
+</file>
+
+<file path=ppt/revisionInfo.xml><?xml version="1.0" encoding="utf-8"?>
+<p1510:revInfo xmlns:a="http://schemas.openxmlformats.org/drawingml/2006/main" xmlns:r="http://schemas.openxmlformats.org/officeDocument/2006/relationships" xmlns:p1510="http://schemas.microsoft.com/office/powerpoint/2015/10/main"/>
 </file>
 
 <file path=ppt/notesMasters/notesMaster1.xml><?xml version="1.0" encoding="utf-8"?>
@@ -1292,7 +1334,7 @@
 </file>
 
 <file path=ppt/slideLayouts/slideLayout2.xml><?xml version="1.0" encoding="utf-8"?>
-<p:sldLayout xmlns:a="http://schemas.openxmlformats.org/drawingml/2006/main" xmlns:r="http://schemas.openxmlformats.org/officeDocument/2006/relationships" xmlns:p="http://schemas.openxmlformats.org/presentationml/2006/main" type="obj" preserve="1">
+<p:sldLayout xmlns:a="http://schemas.openxmlformats.org/drawingml/2006/main" xmlns:r="http://schemas.openxmlformats.org/officeDocument/2006/relationships" xmlns:p="http://schemas.openxmlformats.org/presentationml/2006/main" preserve="1" userDrawn="1">
   <p:cSld name="Titel und Inhalt">
     <p:spTree>
       <p:nvGrpSpPr>
@@ -1341,7 +1383,12 @@
             <p:ph idx="1"/>
           </p:nvPr>
         </p:nvSpPr>
-        <p:spPr/>
+        <p:spPr>
+          <a:xfrm>
+            <a:off x="371475" y="1449390"/>
+            <a:ext cx="11449050" cy="4342546"/>
+          </a:xfrm>
+        </p:spPr>
         <p:txBody>
           <a:bodyPr/>
           <a:lstStyle>
@@ -1455,6 +1502,45 @@
             <a:r>
               <a:rPr lang="en-US" dirty="0"/>
               <a:t>Chapter / Lecture Title</a:t>
+            </a:r>
+          </a:p>
+        </p:txBody>
+      </p:sp>
+      <p:sp>
+        <p:nvSpPr>
+          <p:cNvPr id="11" name="Textplatzhalter 10">
+            <a:extLst>
+              <a:ext uri="{FF2B5EF4-FFF2-40B4-BE49-F238E27FC236}">
+                <a16:creationId xmlns:a16="http://schemas.microsoft.com/office/drawing/2014/main" id="{E3956E78-9881-4D8E-A6BA-8DB32099E829}"/>
+              </a:ext>
+            </a:extLst>
+          </p:cNvPr>
+          <p:cNvSpPr>
+            <a:spLocks noGrp="1"/>
+          </p:cNvSpPr>
+          <p:nvPr>
+            <p:ph type="body" sz="quarter" idx="13"/>
+          </p:nvPr>
+        </p:nvSpPr>
+        <p:spPr>
+          <a:xfrm>
+            <a:off x="371475" y="5899151"/>
+            <a:ext cx="11449050" cy="440104"/>
+          </a:xfrm>
+        </p:spPr>
+        <p:txBody>
+          <a:bodyPr/>
+          <a:lstStyle>
+            <a:lvl1pPr marL="0" indent="0" algn="ctr">
+              <a:buNone/>
+              <a:defRPr sz="1600"/>
+            </a:lvl1pPr>
+          </a:lstStyle>
+          <a:p>
+            <a:pPr lvl="0"/>
+            <a:r>
+              <a:rPr lang="de-DE" dirty="0"/>
+              <a:t>Mastertextformat bearbeiten</a:t>
             </a:r>
           </a:p>
         </p:txBody>
@@ -1712,13 +1798,18 @@
             <p:ph type="title"/>
           </p:nvPr>
         </p:nvSpPr>
-        <p:spPr/>
+        <p:spPr>
+          <a:xfrm>
+            <a:off x="371475" y="3504607"/>
+            <a:ext cx="11449050" cy="679007"/>
+          </a:xfrm>
+        </p:spPr>
         <p:txBody>
           <a:bodyPr/>
           <a:lstStyle/>
           <a:p>
             <a:r>
-              <a:rPr lang="de-DE"/>
+              <a:rPr lang="de-DE" dirty="0"/>
               <a:t>Mastertitelformat bearbeiten</a:t>
             </a:r>
           </a:p>
@@ -3240,6 +3331,42 @@
               <a:rPr lang="en-US" dirty="0"/>
               <a:t>Edit Master text styles</a:t>
             </a:r>
+          </a:p>
+          <a:p>
+            <a:pPr lvl="1"/>
+            <a:r>
+              <a:rPr lang="en-US" dirty="0"/>
+              <a:t>F</a:t>
+            </a:r>
+          </a:p>
+          <a:p>
+            <a:pPr lvl="2"/>
+            <a:r>
+              <a:rPr lang="en-US" dirty="0"/>
+              <a:t>S</a:t>
+            </a:r>
+          </a:p>
+          <a:p>
+            <a:pPr lvl="3"/>
+            <a:r>
+              <a:rPr lang="en-US" dirty="0"/>
+              <a:t>T</a:t>
+            </a:r>
+          </a:p>
+          <a:p>
+            <a:pPr lvl="4"/>
+            <a:r>
+              <a:rPr lang="en-US" dirty="0"/>
+              <a:t>F</a:t>
+            </a:r>
+          </a:p>
+          <a:p>
+            <a:pPr lvl="1"/>
+            <a:endParaRPr lang="en-US" dirty="0"/>
+          </a:p>
+          <a:p>
+            <a:pPr lvl="2"/>
+            <a:endParaRPr lang="en-US" dirty="0"/>
           </a:p>
         </p:txBody>
       </p:sp>
@@ -3599,7 +3726,7 @@
           <a:cs typeface="+mn-cs"/>
         </a:defRPr>
       </a:lvl1pPr>
-      <a:lvl2pPr marL="457200" indent="0" algn="l" defTabSz="914400" rtl="0" eaLnBrk="1" latinLnBrk="0" hangingPunct="1">
+      <a:lvl2pPr marL="800100" indent="-342900" algn="l" defTabSz="914400" rtl="0" eaLnBrk="1" latinLnBrk="0" hangingPunct="1">
         <a:lnSpc>
           <a:spcPct val="90000"/>
         </a:lnSpc>
@@ -3607,7 +3734,7 @@
           <a:spcPts val="500"/>
         </a:spcBef>
         <a:buFont typeface="Arial" panose="020B0604020202020204" pitchFamily="34" charset="0"/>
-        <a:buNone/>
+        <a:buChar char="•"/>
         <a:defRPr sz="2000" kern="1200">
           <a:solidFill>
             <a:schemeClr val="tx1"/>
@@ -3617,7 +3744,7 @@
           <a:cs typeface="+mn-cs"/>
         </a:defRPr>
       </a:lvl2pPr>
-      <a:lvl3pPr marL="914400" indent="0" algn="l" defTabSz="914400" rtl="0" eaLnBrk="1" latinLnBrk="0" hangingPunct="1">
+      <a:lvl3pPr marL="1200150" indent="-285750" algn="l" defTabSz="914400" rtl="0" eaLnBrk="1" latinLnBrk="0" hangingPunct="1">
         <a:lnSpc>
           <a:spcPct val="90000"/>
         </a:lnSpc>
@@ -3625,7 +3752,7 @@
           <a:spcPts val="500"/>
         </a:spcBef>
         <a:buFont typeface="Arial" panose="020B0604020202020204" pitchFamily="34" charset="0"/>
-        <a:buNone/>
+        <a:buChar char="•"/>
         <a:defRPr sz="1800" kern="1200">
           <a:solidFill>
             <a:schemeClr val="tx1"/>
@@ -3635,7 +3762,7 @@
           <a:cs typeface="+mn-cs"/>
         </a:defRPr>
       </a:lvl3pPr>
-      <a:lvl4pPr marL="1371600" indent="0" algn="l" defTabSz="914400" rtl="0" eaLnBrk="1" latinLnBrk="0" hangingPunct="1">
+      <a:lvl4pPr marL="1657350" indent="-285750" algn="l" defTabSz="914400" rtl="0" eaLnBrk="1" latinLnBrk="0" hangingPunct="1">
         <a:lnSpc>
           <a:spcPct val="90000"/>
         </a:lnSpc>
@@ -3643,7 +3770,7 @@
           <a:spcPts val="500"/>
         </a:spcBef>
         <a:buFont typeface="Arial" panose="020B0604020202020204" pitchFamily="34" charset="0"/>
-        <a:buNone/>
+        <a:buChar char="•"/>
         <a:defRPr sz="1600" kern="1200">
           <a:solidFill>
             <a:schemeClr val="tx1"/>
@@ -4099,6 +4226,875 @@
 </p:sld>
 </file>
 
+<file path=ppt/slides/slide10.xml><?xml version="1.0" encoding="utf-8"?>
+<p:sld xmlns:a="http://schemas.openxmlformats.org/drawingml/2006/main" xmlns:r="http://schemas.openxmlformats.org/officeDocument/2006/relationships" xmlns:p="http://schemas.openxmlformats.org/presentationml/2006/main">
+  <p:cSld>
+    <p:spTree>
+      <p:nvGrpSpPr>
+        <p:cNvPr id="1" name=""/>
+        <p:cNvGrpSpPr/>
+        <p:nvPr/>
+      </p:nvGrpSpPr>
+      <p:grpSpPr>
+        <a:xfrm>
+          <a:off x="0" y="0"/>
+          <a:ext cx="0" cy="0"/>
+          <a:chOff x="0" y="0"/>
+          <a:chExt cx="0" cy="0"/>
+        </a:xfrm>
+      </p:grpSpPr>
+      <p:sp>
+        <p:nvSpPr>
+          <p:cNvPr id="8" name="Textplatzhalter 7">
+            <a:extLst>
+              <a:ext uri="{FF2B5EF4-FFF2-40B4-BE49-F238E27FC236}">
+                <a16:creationId xmlns:a16="http://schemas.microsoft.com/office/drawing/2014/main" id="{68A6C956-4B61-415A-9876-24D49D3DAA88}"/>
+              </a:ext>
+            </a:extLst>
+          </p:cNvPr>
+          <p:cNvSpPr>
+            <a:spLocks noGrp="1"/>
+          </p:cNvSpPr>
+          <p:nvPr>
+            <p:ph type="body" idx="1"/>
+          </p:nvPr>
+        </p:nvSpPr>
+        <p:spPr/>
+        <p:txBody>
+          <a:bodyPr/>
+          <a:lstStyle/>
+          <a:p>
+            <a:endParaRPr lang="de-DE"/>
+          </a:p>
+        </p:txBody>
+      </p:sp>
+      <p:sp>
+        <p:nvSpPr>
+          <p:cNvPr id="4" name="Datumsplatzhalter 3">
+            <a:extLst>
+              <a:ext uri="{FF2B5EF4-FFF2-40B4-BE49-F238E27FC236}">
+                <a16:creationId xmlns:a16="http://schemas.microsoft.com/office/drawing/2014/main" id="{0DEA4D4B-53EB-472D-BD50-455E1F60F0AF}"/>
+              </a:ext>
+            </a:extLst>
+          </p:cNvPr>
+          <p:cNvSpPr>
+            <a:spLocks noGrp="1"/>
+          </p:cNvSpPr>
+          <p:nvPr>
+            <p:ph type="dt" sz="half" idx="10"/>
+          </p:nvPr>
+        </p:nvSpPr>
+        <p:spPr/>
+        <p:txBody>
+          <a:bodyPr/>
+          <a:lstStyle/>
+          <a:p>
+            <a:pPr algn="ctr"/>
+            <a:r>
+              <a:rPr lang="de-DE"/>
+              <a:t>SS 2017</a:t>
+            </a:r>
+            <a:endParaRPr lang="en-US" dirty="0"/>
+          </a:p>
+        </p:txBody>
+      </p:sp>
+      <p:sp>
+        <p:nvSpPr>
+          <p:cNvPr id="6" name="Fußzeilenplatzhalter 5">
+            <a:extLst>
+              <a:ext uri="{FF2B5EF4-FFF2-40B4-BE49-F238E27FC236}">
+                <a16:creationId xmlns:a16="http://schemas.microsoft.com/office/drawing/2014/main" id="{0FAD2D3C-6090-48D4-A202-613CA51E6D06}"/>
+              </a:ext>
+            </a:extLst>
+          </p:cNvPr>
+          <p:cNvSpPr>
+            <a:spLocks noGrp="1"/>
+          </p:cNvSpPr>
+          <p:nvPr>
+            <p:ph type="ftr" sz="quarter" idx="11"/>
+          </p:nvPr>
+        </p:nvSpPr>
+        <p:spPr/>
+        <p:txBody>
+          <a:bodyPr/>
+          <a:lstStyle/>
+          <a:p>
+            <a:r>
+              <a:rPr lang="en-US"/>
+              <a:t>Chapter / Lecture Title</a:t>
+            </a:r>
+            <a:endParaRPr lang="en-US" dirty="0"/>
+          </a:p>
+        </p:txBody>
+      </p:sp>
+      <p:sp>
+        <p:nvSpPr>
+          <p:cNvPr id="5" name="Foliennummernplatzhalter 4">
+            <a:extLst>
+              <a:ext uri="{FF2B5EF4-FFF2-40B4-BE49-F238E27FC236}">
+                <a16:creationId xmlns:a16="http://schemas.microsoft.com/office/drawing/2014/main" id="{8C146B64-1416-47DE-B701-746A20FC7B37}"/>
+              </a:ext>
+            </a:extLst>
+          </p:cNvPr>
+          <p:cNvSpPr>
+            <a:spLocks noGrp="1"/>
+          </p:cNvSpPr>
+          <p:nvPr>
+            <p:ph type="sldNum" sz="quarter" idx="12"/>
+          </p:nvPr>
+        </p:nvSpPr>
+        <p:spPr/>
+        <p:txBody>
+          <a:bodyPr/>
+          <a:lstStyle/>
+          <a:p>
+            <a:fld id="{B169C2F2-EDB3-4FE6-84CD-3C84FADA21DC}" type="slidenum">
+              <a:rPr lang="en-US" smtClean="0"/>
+              <a:pPr/>
+              <a:t>10</a:t>
+            </a:fld>
+            <a:endParaRPr lang="en-US" dirty="0"/>
+          </a:p>
+        </p:txBody>
+      </p:sp>
+      <p:sp>
+        <p:nvSpPr>
+          <p:cNvPr id="7" name="Titel 6">
+            <a:extLst>
+              <a:ext uri="{FF2B5EF4-FFF2-40B4-BE49-F238E27FC236}">
+                <a16:creationId xmlns:a16="http://schemas.microsoft.com/office/drawing/2014/main" id="{018CFD1F-1E1C-4E1D-8DAE-874A88A3C4EF}"/>
+              </a:ext>
+            </a:extLst>
+          </p:cNvPr>
+          <p:cNvSpPr>
+            <a:spLocks noGrp="1"/>
+          </p:cNvSpPr>
+          <p:nvPr>
+            <p:ph type="title"/>
+          </p:nvPr>
+        </p:nvSpPr>
+        <p:spPr/>
+        <p:txBody>
+          <a:bodyPr/>
+          <a:lstStyle/>
+          <a:p>
+            <a:r>
+              <a:rPr lang="de-DE" dirty="0"/>
+              <a:t>Behavioral Patterns</a:t>
+            </a:r>
+          </a:p>
+        </p:txBody>
+      </p:sp>
+    </p:spTree>
+    <p:extLst>
+      <p:ext uri="{BB962C8B-B14F-4D97-AF65-F5344CB8AC3E}">
+        <p14:creationId xmlns:p14="http://schemas.microsoft.com/office/powerpoint/2010/main" val="4126433820"/>
+      </p:ext>
+    </p:extLst>
+  </p:cSld>
+  <p:clrMapOvr>
+    <a:masterClrMapping/>
+  </p:clrMapOvr>
+</p:sld>
+</file>
+
+<file path=ppt/slides/slide11.xml><?xml version="1.0" encoding="utf-8"?>
+<p:sld xmlns:a="http://schemas.openxmlformats.org/drawingml/2006/main" xmlns:r="http://schemas.openxmlformats.org/officeDocument/2006/relationships" xmlns:p="http://schemas.openxmlformats.org/presentationml/2006/main">
+  <p:cSld>
+    <p:spTree>
+      <p:nvGrpSpPr>
+        <p:cNvPr id="1" name=""/>
+        <p:cNvGrpSpPr/>
+        <p:nvPr/>
+      </p:nvGrpSpPr>
+      <p:grpSpPr>
+        <a:xfrm>
+          <a:off x="0" y="0"/>
+          <a:ext cx="0" cy="0"/>
+          <a:chOff x="0" y="0"/>
+          <a:chExt cx="0" cy="0"/>
+        </a:xfrm>
+      </p:grpSpPr>
+      <p:sp>
+        <p:nvSpPr>
+          <p:cNvPr id="2" name="Titel 1">
+            <a:extLst>
+              <a:ext uri="{FF2B5EF4-FFF2-40B4-BE49-F238E27FC236}">
+                <a16:creationId xmlns:a16="http://schemas.microsoft.com/office/drawing/2014/main" id="{DE43F6FC-7320-4D5C-82EA-9E8E6E3FB6CA}"/>
+              </a:ext>
+            </a:extLst>
+          </p:cNvPr>
+          <p:cNvSpPr>
+            <a:spLocks noGrp="1"/>
+          </p:cNvSpPr>
+          <p:nvPr>
+            <p:ph type="title"/>
+          </p:nvPr>
+        </p:nvSpPr>
+        <p:spPr/>
+        <p:txBody>
+          <a:bodyPr/>
+          <a:lstStyle/>
+          <a:p>
+            <a:r>
+              <a:rPr lang="de-DE" dirty="0" err="1"/>
+              <a:t>Strategy</a:t>
+            </a:r>
+            <a:r>
+              <a:rPr lang="de-DE" dirty="0"/>
+              <a:t> Pattern</a:t>
+            </a:r>
+          </a:p>
+        </p:txBody>
+      </p:sp>
+      <p:sp>
+        <p:nvSpPr>
+          <p:cNvPr id="4" name="Datumsplatzhalter 3">
+            <a:extLst>
+              <a:ext uri="{FF2B5EF4-FFF2-40B4-BE49-F238E27FC236}">
+                <a16:creationId xmlns:a16="http://schemas.microsoft.com/office/drawing/2014/main" id="{C0F18762-58EE-46CB-8D7F-2CC1410CC188}"/>
+              </a:ext>
+            </a:extLst>
+          </p:cNvPr>
+          <p:cNvSpPr>
+            <a:spLocks noGrp="1"/>
+          </p:cNvSpPr>
+          <p:nvPr>
+            <p:ph type="dt" sz="half" idx="10"/>
+          </p:nvPr>
+        </p:nvSpPr>
+        <p:spPr/>
+        <p:txBody>
+          <a:bodyPr/>
+          <a:lstStyle/>
+          <a:p>
+            <a:pPr algn="ctr"/>
+            <a:r>
+              <a:rPr lang="de-DE"/>
+              <a:t>SS 2017</a:t>
+            </a:r>
+            <a:endParaRPr lang="en-US" dirty="0"/>
+          </a:p>
+        </p:txBody>
+      </p:sp>
+      <p:sp>
+        <p:nvSpPr>
+          <p:cNvPr id="5" name="Foliennummernplatzhalter 4">
+            <a:extLst>
+              <a:ext uri="{FF2B5EF4-FFF2-40B4-BE49-F238E27FC236}">
+                <a16:creationId xmlns:a16="http://schemas.microsoft.com/office/drawing/2014/main" id="{511E8C48-73F7-4DD2-A846-8FB171A98F6B}"/>
+              </a:ext>
+            </a:extLst>
+          </p:cNvPr>
+          <p:cNvSpPr>
+            <a:spLocks noGrp="1"/>
+          </p:cNvSpPr>
+          <p:nvPr>
+            <p:ph type="sldNum" sz="quarter" idx="12"/>
+          </p:nvPr>
+        </p:nvSpPr>
+        <p:spPr/>
+        <p:txBody>
+          <a:bodyPr/>
+          <a:lstStyle/>
+          <a:p>
+            <a:fld id="{B169C2F2-EDB3-4FE6-84CD-3C84FADA21DC}" type="slidenum">
+              <a:rPr lang="en-US" smtClean="0"/>
+              <a:pPr/>
+              <a:t>11</a:t>
+            </a:fld>
+            <a:endParaRPr lang="en-US" dirty="0"/>
+          </a:p>
+        </p:txBody>
+      </p:sp>
+      <p:sp>
+        <p:nvSpPr>
+          <p:cNvPr id="6" name="Fußzeilenplatzhalter 5">
+            <a:extLst>
+              <a:ext uri="{FF2B5EF4-FFF2-40B4-BE49-F238E27FC236}">
+                <a16:creationId xmlns:a16="http://schemas.microsoft.com/office/drawing/2014/main" id="{5DAAEDBA-EAD3-450F-BBB2-378155296830}"/>
+              </a:ext>
+            </a:extLst>
+          </p:cNvPr>
+          <p:cNvSpPr>
+            <a:spLocks noGrp="1"/>
+          </p:cNvSpPr>
+          <p:nvPr>
+            <p:ph type="ftr" sz="quarter" idx="3"/>
+          </p:nvPr>
+        </p:nvSpPr>
+        <p:spPr/>
+        <p:txBody>
+          <a:bodyPr/>
+          <a:lstStyle/>
+          <a:p>
+            <a:r>
+              <a:rPr lang="en-US"/>
+              <a:t>Chapter / Lecture Title</a:t>
+            </a:r>
+            <a:endParaRPr lang="en-US" dirty="0"/>
+          </a:p>
+        </p:txBody>
+      </p:sp>
+      <p:sp>
+        <p:nvSpPr>
+          <p:cNvPr id="7" name="Textplatzhalter 6">
+            <a:extLst>
+              <a:ext uri="{FF2B5EF4-FFF2-40B4-BE49-F238E27FC236}">
+                <a16:creationId xmlns:a16="http://schemas.microsoft.com/office/drawing/2014/main" id="{5881EAD0-FE21-487E-BFFB-379CF2851BBD}"/>
+              </a:ext>
+            </a:extLst>
+          </p:cNvPr>
+          <p:cNvSpPr>
+            <a:spLocks noGrp="1"/>
+          </p:cNvSpPr>
+          <p:nvPr>
+            <p:ph type="body" sz="quarter" idx="13"/>
+          </p:nvPr>
+        </p:nvSpPr>
+        <p:spPr/>
+        <p:txBody>
+          <a:bodyPr/>
+          <a:lstStyle/>
+          <a:p>
+            <a:r>
+              <a:rPr lang="de-DE" dirty="0"/>
+              <a:t>A </a:t>
+            </a:r>
+            <a:r>
+              <a:rPr lang="de-DE" dirty="0" err="1"/>
+              <a:t>strategy</a:t>
+            </a:r>
+            <a:r>
+              <a:rPr lang="de-DE" dirty="0"/>
+              <a:t> </a:t>
+            </a:r>
+            <a:r>
+              <a:rPr lang="de-DE" dirty="0" err="1"/>
+              <a:t>is</a:t>
+            </a:r>
+            <a:r>
+              <a:rPr lang="de-DE" dirty="0"/>
+              <a:t> </a:t>
+            </a:r>
+            <a:r>
+              <a:rPr lang="de-DE" dirty="0" err="1"/>
+              <a:t>chosen</a:t>
+            </a:r>
+            <a:r>
+              <a:rPr lang="de-DE" dirty="0"/>
+              <a:t> on </a:t>
+            </a:r>
+            <a:r>
+              <a:rPr lang="de-DE" b="1" dirty="0" err="1"/>
+              <a:t>runtime</a:t>
+            </a:r>
+            <a:r>
+              <a:rPr lang="de-DE" b="1" dirty="0"/>
+              <a:t> </a:t>
+            </a:r>
+            <a:r>
+              <a:rPr lang="de-DE" dirty="0" err="1"/>
+              <a:t>by</a:t>
+            </a:r>
+            <a:r>
+              <a:rPr lang="de-DE" dirty="0"/>
+              <a:t> </a:t>
+            </a:r>
+            <a:r>
+              <a:rPr lang="de-DE" dirty="0" err="1"/>
+              <a:t>the</a:t>
+            </a:r>
+            <a:r>
+              <a:rPr lang="de-DE" dirty="0"/>
+              <a:t> </a:t>
+            </a:r>
+            <a:r>
+              <a:rPr lang="de-DE" i="1" dirty="0"/>
+              <a:t>Policy </a:t>
+            </a:r>
+            <a:r>
+              <a:rPr lang="de-DE" dirty="0" err="1"/>
+              <a:t>class</a:t>
+            </a:r>
+            <a:r>
+              <a:rPr lang="de-DE" dirty="0"/>
+              <a:t> </a:t>
+            </a:r>
+            <a:r>
+              <a:rPr lang="de-DE" dirty="0" err="1"/>
+              <a:t>before</a:t>
+            </a:r>
+            <a:r>
+              <a:rPr lang="de-DE" dirty="0"/>
+              <a:t> </a:t>
+            </a:r>
+            <a:r>
+              <a:rPr lang="de-DE" dirty="0" err="1"/>
+              <a:t>the</a:t>
+            </a:r>
+            <a:r>
+              <a:rPr lang="de-DE" dirty="0"/>
+              <a:t> </a:t>
+            </a:r>
+            <a:r>
+              <a:rPr lang="de-DE" dirty="0" err="1"/>
+              <a:t>client</a:t>
+            </a:r>
+            <a:r>
+              <a:rPr lang="de-DE" dirty="0"/>
+              <a:t> </a:t>
+            </a:r>
+            <a:r>
+              <a:rPr lang="de-DE" dirty="0" err="1"/>
+              <a:t>calls</a:t>
+            </a:r>
+            <a:r>
+              <a:rPr lang="de-DE" dirty="0"/>
+              <a:t> </a:t>
+            </a:r>
+            <a:r>
+              <a:rPr lang="de-DE" i="1" dirty="0" err="1"/>
+              <a:t>executeAlgorithm</a:t>
+            </a:r>
+            <a:r>
+              <a:rPr lang="de-DE" i="1"/>
+              <a:t>()</a:t>
+            </a:r>
+            <a:endParaRPr lang="de-DE" dirty="0"/>
+          </a:p>
+        </p:txBody>
+      </p:sp>
+      <p:pic>
+        <p:nvPicPr>
+          <p:cNvPr id="8" name="Inhaltsplatzhalter 9">
+            <a:extLst>
+              <a:ext uri="{FF2B5EF4-FFF2-40B4-BE49-F238E27FC236}">
+                <a16:creationId xmlns:a16="http://schemas.microsoft.com/office/drawing/2014/main" id="{75AFCEF5-5FDC-4547-9333-2716D7408C78}"/>
+              </a:ext>
+            </a:extLst>
+          </p:cNvPr>
+          <p:cNvPicPr>
+            <a:picLocks noGrp="1" noChangeAspect="1"/>
+          </p:cNvPicPr>
+          <p:nvPr>
+            <p:ph idx="1"/>
+          </p:nvPr>
+        </p:nvPicPr>
+        <p:blipFill>
+          <a:blip r:embed="rId2">
+            <a:extLst>
+              <a:ext uri="{28A0092B-C50C-407E-A947-70E740481C1C}">
+                <a14:useLocalDpi xmlns:a14="http://schemas.microsoft.com/office/drawing/2010/main" val="0"/>
+              </a:ext>
+            </a:extLst>
+          </a:blip>
+          <a:stretch>
+            <a:fillRect/>
+          </a:stretch>
+        </p:blipFill>
+        <p:spPr>
+          <a:xfrm>
+            <a:off x="880025" y="1449388"/>
+            <a:ext cx="10431949" cy="4341812"/>
+          </a:xfrm>
+        </p:spPr>
+      </p:pic>
+    </p:spTree>
+    <p:extLst>
+      <p:ext uri="{BB962C8B-B14F-4D97-AF65-F5344CB8AC3E}">
+        <p14:creationId xmlns:p14="http://schemas.microsoft.com/office/powerpoint/2010/main" val="1790851058"/>
+      </p:ext>
+    </p:extLst>
+  </p:cSld>
+  <p:clrMapOvr>
+    <a:masterClrMapping/>
+  </p:clrMapOvr>
+</p:sld>
+</file>
+
+<file path=ppt/slides/slide12.xml><?xml version="1.0" encoding="utf-8"?>
+<p:sld xmlns:a="http://schemas.openxmlformats.org/drawingml/2006/main" xmlns:r="http://schemas.openxmlformats.org/officeDocument/2006/relationships" xmlns:p="http://schemas.openxmlformats.org/presentationml/2006/main">
+  <p:cSld>
+    <p:spTree>
+      <p:nvGrpSpPr>
+        <p:cNvPr id="1" name=""/>
+        <p:cNvGrpSpPr/>
+        <p:nvPr/>
+      </p:nvGrpSpPr>
+      <p:grpSpPr>
+        <a:xfrm>
+          <a:off x="0" y="0"/>
+          <a:ext cx="0" cy="0"/>
+          <a:chOff x="0" y="0"/>
+          <a:chExt cx="0" cy="0"/>
+        </a:xfrm>
+      </p:grpSpPr>
+      <p:sp>
+        <p:nvSpPr>
+          <p:cNvPr id="7" name="Titel 6">
+            <a:extLst>
+              <a:ext uri="{FF2B5EF4-FFF2-40B4-BE49-F238E27FC236}">
+                <a16:creationId xmlns:a16="http://schemas.microsoft.com/office/drawing/2014/main" id="{423B488A-B873-450E-AED4-6F56A3B5F69B}"/>
+              </a:ext>
+            </a:extLst>
+          </p:cNvPr>
+          <p:cNvSpPr>
+            <a:spLocks noGrp="1"/>
+          </p:cNvSpPr>
+          <p:nvPr>
+            <p:ph type="title"/>
+          </p:nvPr>
+        </p:nvSpPr>
+        <p:spPr/>
+        <p:txBody>
+          <a:bodyPr/>
+          <a:lstStyle/>
+          <a:p>
+            <a:r>
+              <a:rPr lang="de-DE" dirty="0" err="1"/>
+              <a:t>Strategy</a:t>
+            </a:r>
+            <a:r>
+              <a:rPr lang="de-DE" dirty="0"/>
+              <a:t> Pattern</a:t>
+            </a:r>
+          </a:p>
+        </p:txBody>
+      </p:sp>
+      <p:sp>
+        <p:nvSpPr>
+          <p:cNvPr id="3" name="Datumsplatzhalter 2">
+            <a:extLst>
+              <a:ext uri="{FF2B5EF4-FFF2-40B4-BE49-F238E27FC236}">
+                <a16:creationId xmlns:a16="http://schemas.microsoft.com/office/drawing/2014/main" id="{CCC522F6-D5C9-4C4A-9F01-8A832BD91714}"/>
+              </a:ext>
+            </a:extLst>
+          </p:cNvPr>
+          <p:cNvSpPr>
+            <a:spLocks noGrp="1"/>
+          </p:cNvSpPr>
+          <p:nvPr>
+            <p:ph type="dt" sz="half" idx="10"/>
+          </p:nvPr>
+        </p:nvSpPr>
+        <p:spPr/>
+        <p:txBody>
+          <a:bodyPr/>
+          <a:lstStyle/>
+          <a:p>
+            <a:r>
+              <a:rPr lang="de-DE"/>
+              <a:t>SS 2017</a:t>
+            </a:r>
+            <a:endParaRPr lang="en-US" dirty="0"/>
+          </a:p>
+        </p:txBody>
+      </p:sp>
+      <p:sp>
+        <p:nvSpPr>
+          <p:cNvPr id="5" name="Foliennummernplatzhalter 4">
+            <a:extLst>
+              <a:ext uri="{FF2B5EF4-FFF2-40B4-BE49-F238E27FC236}">
+                <a16:creationId xmlns:a16="http://schemas.microsoft.com/office/drawing/2014/main" id="{187D1BE0-C494-4ED1-BC06-0A3780614BDA}"/>
+              </a:ext>
+            </a:extLst>
+          </p:cNvPr>
+          <p:cNvSpPr>
+            <a:spLocks noGrp="1"/>
+          </p:cNvSpPr>
+          <p:nvPr>
+            <p:ph type="sldNum" sz="quarter" idx="12"/>
+          </p:nvPr>
+        </p:nvSpPr>
+        <p:spPr/>
+        <p:txBody>
+          <a:bodyPr/>
+          <a:lstStyle/>
+          <a:p>
+            <a:fld id="{B169C2F2-EDB3-4FE6-84CD-3C84FADA21DC}" type="slidenum">
+              <a:rPr lang="en-US" smtClean="0"/>
+              <a:pPr/>
+              <a:t>12</a:t>
+            </a:fld>
+            <a:endParaRPr lang="en-US" dirty="0"/>
+          </a:p>
+        </p:txBody>
+      </p:sp>
+      <p:sp>
+        <p:nvSpPr>
+          <p:cNvPr id="4" name="Fußzeilenplatzhalter 3">
+            <a:extLst>
+              <a:ext uri="{FF2B5EF4-FFF2-40B4-BE49-F238E27FC236}">
+                <a16:creationId xmlns:a16="http://schemas.microsoft.com/office/drawing/2014/main" id="{8580C533-0908-42FE-B9CE-90181FA08856}"/>
+              </a:ext>
+            </a:extLst>
+          </p:cNvPr>
+          <p:cNvSpPr>
+            <a:spLocks noGrp="1"/>
+          </p:cNvSpPr>
+          <p:nvPr>
+            <p:ph type="ftr" sz="quarter" idx="3"/>
+          </p:nvPr>
+        </p:nvSpPr>
+        <p:spPr/>
+        <p:txBody>
+          <a:bodyPr/>
+          <a:lstStyle/>
+          <a:p>
+            <a:r>
+              <a:rPr lang="en-US"/>
+              <a:t>Chapter / Lecture title</a:t>
+            </a:r>
+            <a:endParaRPr lang="en-US" dirty="0"/>
+          </a:p>
+        </p:txBody>
+      </p:sp>
+      <p:sp>
+        <p:nvSpPr>
+          <p:cNvPr id="6" name="Inhaltsplatzhalter 5">
+            <a:extLst>
+              <a:ext uri="{FF2B5EF4-FFF2-40B4-BE49-F238E27FC236}">
+                <a16:creationId xmlns:a16="http://schemas.microsoft.com/office/drawing/2014/main" id="{53B6895B-BF79-4ACD-A472-DEE72C859E14}"/>
+              </a:ext>
+            </a:extLst>
+          </p:cNvPr>
+          <p:cNvSpPr>
+            <a:spLocks noGrp="1"/>
+          </p:cNvSpPr>
+          <p:nvPr>
+            <p:ph idx="1"/>
+          </p:nvPr>
+        </p:nvSpPr>
+        <p:spPr/>
+        <p:txBody>
+          <a:bodyPr/>
+          <a:lstStyle/>
+          <a:p>
+            <a:r>
+              <a:rPr lang="de-DE" dirty="0" err="1"/>
+              <a:t>Suited</a:t>
+            </a:r>
+            <a:r>
+              <a:rPr lang="de-DE" dirty="0"/>
+              <a:t> </a:t>
+            </a:r>
+            <a:r>
+              <a:rPr lang="de-DE" dirty="0" err="1"/>
+              <a:t>for</a:t>
+            </a:r>
+            <a:r>
+              <a:rPr lang="de-DE" dirty="0"/>
+              <a:t> </a:t>
+            </a:r>
+            <a:r>
+              <a:rPr lang="de-DE" dirty="0" err="1"/>
+              <a:t>situations</a:t>
+            </a:r>
+            <a:r>
+              <a:rPr lang="de-DE" dirty="0"/>
+              <a:t> </a:t>
+            </a:r>
+            <a:r>
+              <a:rPr lang="de-DE" dirty="0" err="1"/>
+              <a:t>where</a:t>
+            </a:r>
+            <a:r>
+              <a:rPr lang="de-DE" dirty="0"/>
+              <a:t> different </a:t>
+            </a:r>
+            <a:r>
+              <a:rPr lang="de-DE" dirty="0" err="1"/>
+              <a:t>algorithms</a:t>
+            </a:r>
+            <a:r>
+              <a:rPr lang="de-DE" dirty="0"/>
+              <a:t> </a:t>
+            </a:r>
+            <a:r>
+              <a:rPr lang="de-DE" dirty="0" err="1"/>
+              <a:t>are</a:t>
+            </a:r>
+            <a:r>
+              <a:rPr lang="de-DE" dirty="0"/>
+              <a:t> </a:t>
+            </a:r>
+            <a:r>
+              <a:rPr lang="de-DE" dirty="0" err="1"/>
+              <a:t>available</a:t>
+            </a:r>
+            <a:r>
+              <a:rPr lang="de-DE" dirty="0"/>
+              <a:t> </a:t>
+            </a:r>
+            <a:r>
+              <a:rPr lang="de-DE" dirty="0" err="1"/>
+              <a:t>for</a:t>
+            </a:r>
+            <a:r>
+              <a:rPr lang="de-DE" dirty="0"/>
+              <a:t> a </a:t>
+            </a:r>
+            <a:r>
+              <a:rPr lang="de-DE" dirty="0" err="1"/>
+              <a:t>problem</a:t>
+            </a:r>
+            <a:endParaRPr lang="de-DE" dirty="0"/>
+          </a:p>
+          <a:p>
+            <a:r>
+              <a:rPr lang="de-DE" dirty="0"/>
+              <a:t>In </a:t>
+            </a:r>
+            <a:r>
+              <a:rPr lang="de-DE" dirty="0" err="1"/>
+              <a:t>contrast</a:t>
+            </a:r>
+            <a:r>
+              <a:rPr lang="de-DE" dirty="0"/>
+              <a:t> </a:t>
+            </a:r>
+            <a:r>
+              <a:rPr lang="de-DE" dirty="0" err="1"/>
+              <a:t>to</a:t>
+            </a:r>
+            <a:r>
+              <a:rPr lang="de-DE" dirty="0"/>
+              <a:t> </a:t>
+            </a:r>
+            <a:r>
+              <a:rPr lang="de-DE" dirty="0" err="1"/>
+              <a:t>the</a:t>
+            </a:r>
+            <a:r>
+              <a:rPr lang="de-DE" dirty="0"/>
+              <a:t> </a:t>
+            </a:r>
+            <a:r>
+              <a:rPr lang="de-DE" dirty="0" err="1"/>
+              <a:t>bridge</a:t>
+            </a:r>
+            <a:r>
+              <a:rPr lang="de-DE" dirty="0"/>
+              <a:t> </a:t>
+            </a:r>
+            <a:r>
+              <a:rPr lang="de-DE" dirty="0" err="1"/>
+              <a:t>pattern</a:t>
+            </a:r>
+            <a:r>
+              <a:rPr lang="de-DE" dirty="0"/>
+              <a:t> (</a:t>
+            </a:r>
+            <a:r>
+              <a:rPr lang="de-DE" dirty="0" err="1"/>
+              <a:t>structural</a:t>
+            </a:r>
+            <a:r>
+              <a:rPr lang="de-DE" dirty="0"/>
+              <a:t> </a:t>
+            </a:r>
+            <a:r>
+              <a:rPr lang="de-DE" dirty="0" err="1"/>
+              <a:t>decisions</a:t>
+            </a:r>
+            <a:r>
+              <a:rPr lang="de-DE" dirty="0"/>
+              <a:t>) </a:t>
+            </a:r>
+            <a:r>
+              <a:rPr lang="de-DE" dirty="0" err="1"/>
+              <a:t>it</a:t>
+            </a:r>
+            <a:r>
+              <a:rPr lang="de-DE" dirty="0"/>
+              <a:t> </a:t>
+            </a:r>
+            <a:r>
+              <a:rPr lang="de-DE" dirty="0" err="1"/>
+              <a:t>choses</a:t>
+            </a:r>
+            <a:r>
+              <a:rPr lang="de-DE" dirty="0"/>
+              <a:t> </a:t>
+            </a:r>
+            <a:r>
+              <a:rPr lang="de-DE" dirty="0" err="1"/>
+              <a:t>the</a:t>
+            </a:r>
+            <a:r>
+              <a:rPr lang="de-DE" dirty="0"/>
+              <a:t> </a:t>
+            </a:r>
+            <a:r>
+              <a:rPr lang="de-DE" dirty="0" err="1"/>
+              <a:t>implementation</a:t>
+            </a:r>
+            <a:r>
+              <a:rPr lang="de-DE" dirty="0"/>
+              <a:t> </a:t>
+            </a:r>
+            <a:r>
+              <a:rPr lang="de-DE" dirty="0" err="1"/>
+              <a:t>to</a:t>
+            </a:r>
+            <a:r>
+              <a:rPr lang="de-DE" dirty="0"/>
+              <a:t> </a:t>
+            </a:r>
+            <a:r>
+              <a:rPr lang="de-DE" dirty="0" err="1"/>
+              <a:t>use</a:t>
+            </a:r>
+            <a:r>
+              <a:rPr lang="de-DE" dirty="0"/>
+              <a:t> at </a:t>
+            </a:r>
+            <a:r>
+              <a:rPr lang="de-DE" dirty="0" err="1"/>
+              <a:t>runtime</a:t>
+            </a:r>
+            <a:r>
+              <a:rPr lang="de-DE" dirty="0"/>
+              <a:t> and </a:t>
+            </a:r>
+            <a:r>
+              <a:rPr lang="de-DE" dirty="0" err="1"/>
+              <a:t>therefore</a:t>
+            </a:r>
+            <a:r>
+              <a:rPr lang="de-DE" dirty="0"/>
+              <a:t> alters </a:t>
+            </a:r>
+            <a:r>
+              <a:rPr lang="de-DE" dirty="0" err="1"/>
+              <a:t>the</a:t>
+            </a:r>
+            <a:r>
+              <a:rPr lang="de-DE" dirty="0"/>
+              <a:t> </a:t>
+            </a:r>
+            <a:r>
+              <a:rPr lang="de-DE" dirty="0" err="1"/>
+              <a:t>bahavior</a:t>
+            </a:r>
+            <a:endParaRPr lang="de-DE" dirty="0"/>
+          </a:p>
+        </p:txBody>
+      </p:sp>
+    </p:spTree>
+    <p:extLst>
+      <p:ext uri="{BB962C8B-B14F-4D97-AF65-F5344CB8AC3E}">
+        <p14:creationId xmlns:p14="http://schemas.microsoft.com/office/powerpoint/2010/main" val="310961670"/>
+      </p:ext>
+    </p:extLst>
+  </p:cSld>
+  <p:clrMapOvr>
+    <a:masterClrMapping/>
+  </p:clrMapOvr>
+</p:sld>
+</file>
+
 <file path=ppt/slides/slide2.xml><?xml version="1.0" encoding="utf-8"?>
 <p:sld xmlns:a="http://schemas.openxmlformats.org/drawingml/2006/main" xmlns:r="http://schemas.openxmlformats.org/officeDocument/2006/relationships" xmlns:p="http://schemas.openxmlformats.org/presentationml/2006/main">
   <p:cSld>
@@ -4118,6 +5114,178 @@
       </p:grpSpPr>
       <p:sp>
         <p:nvSpPr>
+          <p:cNvPr id="8" name="Textplatzhalter 7">
+            <a:extLst>
+              <a:ext uri="{FF2B5EF4-FFF2-40B4-BE49-F238E27FC236}">
+                <a16:creationId xmlns:a16="http://schemas.microsoft.com/office/drawing/2014/main" id="{5D6CDC5D-5FF4-4F94-BCD8-D569B0FE2BDD}"/>
+              </a:ext>
+            </a:extLst>
+          </p:cNvPr>
+          <p:cNvSpPr>
+            <a:spLocks noGrp="1"/>
+          </p:cNvSpPr>
+          <p:nvPr>
+            <p:ph type="body" idx="1"/>
+          </p:nvPr>
+        </p:nvSpPr>
+        <p:spPr/>
+        <p:txBody>
+          <a:bodyPr/>
+          <a:lstStyle/>
+          <a:p>
+            <a:endParaRPr lang="de-DE"/>
+          </a:p>
+        </p:txBody>
+      </p:sp>
+      <p:sp>
+        <p:nvSpPr>
+          <p:cNvPr id="4" name="Datumsplatzhalter 3">
+            <a:extLst>
+              <a:ext uri="{FF2B5EF4-FFF2-40B4-BE49-F238E27FC236}">
+                <a16:creationId xmlns:a16="http://schemas.microsoft.com/office/drawing/2014/main" id="{8D504AB8-68DB-4292-BEA9-957FDDD94282}"/>
+              </a:ext>
+            </a:extLst>
+          </p:cNvPr>
+          <p:cNvSpPr>
+            <a:spLocks noGrp="1"/>
+          </p:cNvSpPr>
+          <p:nvPr>
+            <p:ph type="dt" sz="half" idx="10"/>
+          </p:nvPr>
+        </p:nvSpPr>
+        <p:spPr/>
+        <p:txBody>
+          <a:bodyPr/>
+          <a:lstStyle/>
+          <a:p>
+            <a:pPr algn="ctr"/>
+            <a:r>
+              <a:rPr lang="de-DE"/>
+              <a:t>SS 2017</a:t>
+            </a:r>
+            <a:endParaRPr lang="en-US" dirty="0"/>
+          </a:p>
+        </p:txBody>
+      </p:sp>
+      <p:sp>
+        <p:nvSpPr>
+          <p:cNvPr id="6" name="Fußzeilenplatzhalter 5">
+            <a:extLst>
+              <a:ext uri="{FF2B5EF4-FFF2-40B4-BE49-F238E27FC236}">
+                <a16:creationId xmlns:a16="http://schemas.microsoft.com/office/drawing/2014/main" id="{1653B968-BB12-4F1F-9D47-778BC40574AA}"/>
+              </a:ext>
+            </a:extLst>
+          </p:cNvPr>
+          <p:cNvSpPr>
+            <a:spLocks noGrp="1"/>
+          </p:cNvSpPr>
+          <p:nvPr>
+            <p:ph type="ftr" sz="quarter" idx="11"/>
+          </p:nvPr>
+        </p:nvSpPr>
+        <p:spPr/>
+        <p:txBody>
+          <a:bodyPr/>
+          <a:lstStyle/>
+          <a:p>
+            <a:r>
+              <a:rPr lang="en-US"/>
+              <a:t>Chapter / Lecture Title</a:t>
+            </a:r>
+            <a:endParaRPr lang="en-US" dirty="0"/>
+          </a:p>
+        </p:txBody>
+      </p:sp>
+      <p:sp>
+        <p:nvSpPr>
+          <p:cNvPr id="5" name="Foliennummernplatzhalter 4">
+            <a:extLst>
+              <a:ext uri="{FF2B5EF4-FFF2-40B4-BE49-F238E27FC236}">
+                <a16:creationId xmlns:a16="http://schemas.microsoft.com/office/drawing/2014/main" id="{462067BB-9FE7-4AAC-83C1-DD4B9E206739}"/>
+              </a:ext>
+            </a:extLst>
+          </p:cNvPr>
+          <p:cNvSpPr>
+            <a:spLocks noGrp="1"/>
+          </p:cNvSpPr>
+          <p:nvPr>
+            <p:ph type="sldNum" sz="quarter" idx="12"/>
+          </p:nvPr>
+        </p:nvSpPr>
+        <p:spPr/>
+        <p:txBody>
+          <a:bodyPr/>
+          <a:lstStyle/>
+          <a:p>
+            <a:fld id="{B169C2F2-EDB3-4FE6-84CD-3C84FADA21DC}" type="slidenum">
+              <a:rPr lang="en-US" smtClean="0"/>
+              <a:pPr/>
+              <a:t>2</a:t>
+            </a:fld>
+            <a:endParaRPr lang="en-US" dirty="0"/>
+          </a:p>
+        </p:txBody>
+      </p:sp>
+      <p:sp>
+        <p:nvSpPr>
+          <p:cNvPr id="7" name="Titel 6">
+            <a:extLst>
+              <a:ext uri="{FF2B5EF4-FFF2-40B4-BE49-F238E27FC236}">
+                <a16:creationId xmlns:a16="http://schemas.microsoft.com/office/drawing/2014/main" id="{33224FFD-8C5B-495A-B4AC-AE98625567F8}"/>
+              </a:ext>
+            </a:extLst>
+          </p:cNvPr>
+          <p:cNvSpPr>
+            <a:spLocks noGrp="1"/>
+          </p:cNvSpPr>
+          <p:nvPr>
+            <p:ph type="title"/>
+          </p:nvPr>
+        </p:nvSpPr>
+        <p:spPr/>
+        <p:txBody>
+          <a:bodyPr/>
+          <a:lstStyle/>
+          <a:p>
+            <a:r>
+              <a:rPr lang="de-DE" dirty="0"/>
+              <a:t>Design Patterns</a:t>
+            </a:r>
+          </a:p>
+        </p:txBody>
+      </p:sp>
+    </p:spTree>
+    <p:extLst>
+      <p:ext uri="{BB962C8B-B14F-4D97-AF65-F5344CB8AC3E}">
+        <p14:creationId xmlns:p14="http://schemas.microsoft.com/office/powerpoint/2010/main" val="3780542593"/>
+      </p:ext>
+    </p:extLst>
+  </p:cSld>
+  <p:clrMapOvr>
+    <a:masterClrMapping/>
+  </p:clrMapOvr>
+</p:sld>
+</file>
+
+<file path=ppt/slides/slide3.xml><?xml version="1.0" encoding="utf-8"?>
+<p:sld xmlns:a="http://schemas.openxmlformats.org/drawingml/2006/main" xmlns:r="http://schemas.openxmlformats.org/officeDocument/2006/relationships" xmlns:p="http://schemas.openxmlformats.org/presentationml/2006/main">
+  <p:cSld>
+    <p:spTree>
+      <p:nvGrpSpPr>
+        <p:cNvPr id="1" name=""/>
+        <p:cNvGrpSpPr/>
+        <p:nvPr/>
+      </p:nvGrpSpPr>
+      <p:grpSpPr>
+        <a:xfrm>
+          <a:off x="0" y="0"/>
+          <a:ext cx="0" cy="0"/>
+          <a:chOff x="0" y="0"/>
+          <a:chExt cx="0" cy="0"/>
+        </a:xfrm>
+      </p:grpSpPr>
+      <p:sp>
+        <p:nvSpPr>
           <p:cNvPr id="2" name="Titel 1">
             <a:extLst>
               <a:ext uri="{FF2B5EF4-FFF2-40B4-BE49-F238E27FC236}">
@@ -4137,7 +5305,192 @@
           <a:bodyPr/>
           <a:lstStyle/>
           <a:p>
-            <a:endParaRPr lang="de-DE"/>
+            <a:r>
+              <a:rPr lang="de-DE" dirty="0"/>
+              <a:t>Adapter Pattern</a:t>
+            </a:r>
+          </a:p>
+        </p:txBody>
+      </p:sp>
+      <p:pic>
+        <p:nvPicPr>
+          <p:cNvPr id="8" name="Inhaltsplatzhalter 7">
+            <a:extLst>
+              <a:ext uri="{FF2B5EF4-FFF2-40B4-BE49-F238E27FC236}">
+                <a16:creationId xmlns:a16="http://schemas.microsoft.com/office/drawing/2014/main" id="{A7B2140D-8E77-4F73-8A2A-61D21911CF4F}"/>
+              </a:ext>
+            </a:extLst>
+          </p:cNvPr>
+          <p:cNvPicPr>
+            <a:picLocks noGrp="1" noChangeAspect="1"/>
+          </p:cNvPicPr>
+          <p:nvPr>
+            <p:ph idx="1"/>
+          </p:nvPr>
+        </p:nvPicPr>
+        <p:blipFill>
+          <a:blip r:embed="rId2">
+            <a:extLst>
+              <a:ext uri="{28A0092B-C50C-407E-A947-70E740481C1C}">
+                <a14:useLocalDpi xmlns:a14="http://schemas.microsoft.com/office/drawing/2010/main" val="0"/>
+              </a:ext>
+            </a:extLst>
+          </a:blip>
+          <a:stretch>
+            <a:fillRect/>
+          </a:stretch>
+        </p:blipFill>
+        <p:spPr>
+          <a:xfrm>
+            <a:off x="2725149" y="1302026"/>
+            <a:ext cx="6733483" cy="4748768"/>
+          </a:xfrm>
+        </p:spPr>
+      </p:pic>
+      <p:sp>
+        <p:nvSpPr>
+          <p:cNvPr id="4" name="Datumsplatzhalter 3">
+            <a:extLst>
+              <a:ext uri="{FF2B5EF4-FFF2-40B4-BE49-F238E27FC236}">
+                <a16:creationId xmlns:a16="http://schemas.microsoft.com/office/drawing/2014/main" id="{03C27370-0195-48AB-84ED-505D96018DFF}"/>
+              </a:ext>
+            </a:extLst>
+          </p:cNvPr>
+          <p:cNvSpPr>
+            <a:spLocks noGrp="1"/>
+          </p:cNvSpPr>
+          <p:nvPr>
+            <p:ph type="dt" sz="half" idx="10"/>
+          </p:nvPr>
+        </p:nvSpPr>
+        <p:spPr/>
+        <p:txBody>
+          <a:bodyPr/>
+          <a:lstStyle/>
+          <a:p>
+            <a:pPr algn="ctr"/>
+            <a:r>
+              <a:rPr lang="de-DE"/>
+              <a:t>SS 2017</a:t>
+            </a:r>
+            <a:endParaRPr lang="en-US" dirty="0"/>
+          </a:p>
+        </p:txBody>
+      </p:sp>
+      <p:sp>
+        <p:nvSpPr>
+          <p:cNvPr id="5" name="Foliennummernplatzhalter 4">
+            <a:extLst>
+              <a:ext uri="{FF2B5EF4-FFF2-40B4-BE49-F238E27FC236}">
+                <a16:creationId xmlns:a16="http://schemas.microsoft.com/office/drawing/2014/main" id="{A0F33F2F-1D2C-4FD5-8068-E5E97BDF33B7}"/>
+              </a:ext>
+            </a:extLst>
+          </p:cNvPr>
+          <p:cNvSpPr>
+            <a:spLocks noGrp="1"/>
+          </p:cNvSpPr>
+          <p:nvPr>
+            <p:ph type="sldNum" sz="quarter" idx="12"/>
+          </p:nvPr>
+        </p:nvSpPr>
+        <p:spPr/>
+        <p:txBody>
+          <a:bodyPr/>
+          <a:lstStyle/>
+          <a:p>
+            <a:fld id="{B169C2F2-EDB3-4FE6-84CD-3C84FADA21DC}" type="slidenum">
+              <a:rPr lang="en-US" smtClean="0"/>
+              <a:pPr/>
+              <a:t>3</a:t>
+            </a:fld>
+            <a:endParaRPr lang="en-US" dirty="0"/>
+          </a:p>
+        </p:txBody>
+      </p:sp>
+      <p:sp>
+        <p:nvSpPr>
+          <p:cNvPr id="6" name="Fußzeilenplatzhalter 5">
+            <a:extLst>
+              <a:ext uri="{FF2B5EF4-FFF2-40B4-BE49-F238E27FC236}">
+                <a16:creationId xmlns:a16="http://schemas.microsoft.com/office/drawing/2014/main" id="{59B7EAC1-70DA-4917-9534-CCBA447D924C}"/>
+              </a:ext>
+            </a:extLst>
+          </p:cNvPr>
+          <p:cNvSpPr>
+            <a:spLocks noGrp="1"/>
+          </p:cNvSpPr>
+          <p:nvPr>
+            <p:ph type="ftr" sz="quarter" idx="3"/>
+          </p:nvPr>
+        </p:nvSpPr>
+        <p:spPr/>
+        <p:txBody>
+          <a:bodyPr/>
+          <a:lstStyle/>
+          <a:p>
+            <a:r>
+              <a:rPr lang="en-US"/>
+              <a:t>Chapter / Lecture Title</a:t>
+            </a:r>
+            <a:endParaRPr lang="en-US" dirty="0"/>
+          </a:p>
+        </p:txBody>
+      </p:sp>
+    </p:spTree>
+    <p:extLst>
+      <p:ext uri="{BB962C8B-B14F-4D97-AF65-F5344CB8AC3E}">
+        <p14:creationId xmlns:p14="http://schemas.microsoft.com/office/powerpoint/2010/main" val="1015307315"/>
+      </p:ext>
+    </p:extLst>
+  </p:cSld>
+  <p:clrMapOvr>
+    <a:masterClrMapping/>
+  </p:clrMapOvr>
+</p:sld>
+</file>
+
+<file path=ppt/slides/slide4.xml><?xml version="1.0" encoding="utf-8"?>
+<p:sld xmlns:a="http://schemas.openxmlformats.org/drawingml/2006/main" xmlns:r="http://schemas.openxmlformats.org/officeDocument/2006/relationships" xmlns:p="http://schemas.openxmlformats.org/presentationml/2006/main">
+  <p:cSld>
+    <p:spTree>
+      <p:nvGrpSpPr>
+        <p:cNvPr id="1" name=""/>
+        <p:cNvGrpSpPr/>
+        <p:nvPr/>
+      </p:nvGrpSpPr>
+      <p:grpSpPr>
+        <a:xfrm>
+          <a:off x="0" y="0"/>
+          <a:ext cx="0" cy="0"/>
+          <a:chOff x="0" y="0"/>
+          <a:chExt cx="0" cy="0"/>
+        </a:xfrm>
+      </p:grpSpPr>
+      <p:sp>
+        <p:nvSpPr>
+          <p:cNvPr id="2" name="Titel 1">
+            <a:extLst>
+              <a:ext uri="{FF2B5EF4-FFF2-40B4-BE49-F238E27FC236}">
+                <a16:creationId xmlns:a16="http://schemas.microsoft.com/office/drawing/2014/main" id="{61BBED7E-C334-415B-ADC4-5F3CB6F666FD}"/>
+              </a:ext>
+            </a:extLst>
+          </p:cNvPr>
+          <p:cNvSpPr>
+            <a:spLocks noGrp="1"/>
+          </p:cNvSpPr>
+          <p:nvPr>
+            <p:ph type="title"/>
+          </p:nvPr>
+        </p:nvSpPr>
+        <p:spPr/>
+        <p:txBody>
+          <a:bodyPr/>
+          <a:lstStyle/>
+          <a:p>
+            <a:r>
+              <a:rPr lang="de-DE" dirty="0"/>
+              <a:t>Adapter Pattern</a:t>
+            </a:r>
           </a:p>
         </p:txBody>
       </p:sp>
@@ -4162,7 +5515,93 @@
           <a:bodyPr/>
           <a:lstStyle/>
           <a:p>
-            <a:endParaRPr lang="de-DE"/>
+            <a:r>
+              <a:rPr lang="de-DE" dirty="0" err="1"/>
+              <a:t>Connects</a:t>
+            </a:r>
+            <a:r>
+              <a:rPr lang="de-DE" dirty="0"/>
+              <a:t> </a:t>
+            </a:r>
+            <a:r>
+              <a:rPr lang="de-DE" dirty="0" err="1"/>
+              <a:t>incompatible</a:t>
+            </a:r>
+            <a:r>
+              <a:rPr lang="de-DE" dirty="0"/>
+              <a:t> </a:t>
+            </a:r>
+            <a:r>
+              <a:rPr lang="de-DE" dirty="0" err="1"/>
+              <a:t>components</a:t>
+            </a:r>
+            <a:endParaRPr lang="de-DE" dirty="0"/>
+          </a:p>
+          <a:p>
+            <a:pPr marL="800100" lvl="1" indent="-342900">
+              <a:buFont typeface="Arial" panose="020B0604020202020204" pitchFamily="34" charset="0"/>
+              <a:buChar char="•"/>
+            </a:pPr>
+            <a:r>
+              <a:rPr lang="de-DE" dirty="0"/>
+              <a:t>Reuse </a:t>
+            </a:r>
+            <a:r>
+              <a:rPr lang="de-DE" dirty="0" err="1"/>
+              <a:t>existing</a:t>
+            </a:r>
+            <a:r>
+              <a:rPr lang="de-DE" dirty="0"/>
+              <a:t> </a:t>
+            </a:r>
+            <a:r>
+              <a:rPr lang="de-DE" dirty="0" err="1"/>
+              <a:t>components</a:t>
+            </a:r>
+            <a:endParaRPr lang="de-DE" dirty="0"/>
+          </a:p>
+          <a:p>
+            <a:pPr marL="800100" lvl="1" indent="-342900">
+              <a:buFont typeface="Arial" panose="020B0604020202020204" pitchFamily="34" charset="0"/>
+              <a:buChar char="•"/>
+            </a:pPr>
+            <a:r>
+              <a:rPr lang="de-DE" dirty="0" err="1"/>
+              <a:t>Convert</a:t>
+            </a:r>
+            <a:r>
+              <a:rPr lang="de-DE" dirty="0"/>
+              <a:t> an </a:t>
+            </a:r>
+            <a:r>
+              <a:rPr lang="de-DE" dirty="0" err="1"/>
+              <a:t>interface</a:t>
+            </a:r>
+            <a:r>
+              <a:rPr lang="de-DE" dirty="0"/>
+              <a:t> </a:t>
+            </a:r>
+            <a:r>
+              <a:rPr lang="de-DE" dirty="0" err="1"/>
+              <a:t>to</a:t>
+            </a:r>
+            <a:r>
+              <a:rPr lang="de-DE" dirty="0"/>
+              <a:t> </a:t>
+            </a:r>
+            <a:r>
+              <a:rPr lang="de-DE" dirty="0" err="1"/>
+              <a:t>another</a:t>
+            </a:r>
+            <a:r>
+              <a:rPr lang="de-DE" dirty="0"/>
+              <a:t> </a:t>
+            </a:r>
+            <a:r>
+              <a:rPr lang="de-DE" dirty="0" err="1"/>
+              <a:t>interface</a:t>
+            </a:r>
+            <a:endParaRPr lang="de-DE" dirty="0"/>
           </a:p>
         </p:txBody>
       </p:sp>
@@ -4220,7 +5659,7 @@
             <a:fld id="{B169C2F2-EDB3-4FE6-84CD-3C84FADA21DC}" type="slidenum">
               <a:rPr lang="en-US" smtClean="0"/>
               <a:pPr/>
-              <a:t>2</a:t>
+              <a:t>4</a:t>
             </a:fld>
             <a:endParaRPr lang="en-US" dirty="0"/>
           </a:p>
@@ -4258,7 +5697,1748 @@
     </p:spTree>
     <p:extLst>
       <p:ext uri="{BB962C8B-B14F-4D97-AF65-F5344CB8AC3E}">
-        <p14:creationId xmlns:p14="http://schemas.microsoft.com/office/powerpoint/2010/main" val="1015307315"/>
+        <p14:creationId xmlns:p14="http://schemas.microsoft.com/office/powerpoint/2010/main" val="1497678123"/>
+      </p:ext>
+    </p:extLst>
+  </p:cSld>
+  <p:clrMapOvr>
+    <a:masterClrMapping/>
+  </p:clrMapOvr>
+</p:sld>
+</file>
+
+<file path=ppt/slides/slide5.xml><?xml version="1.0" encoding="utf-8"?>
+<p:sld xmlns:a="http://schemas.openxmlformats.org/drawingml/2006/main" xmlns:r="http://schemas.openxmlformats.org/officeDocument/2006/relationships" xmlns:p="http://schemas.openxmlformats.org/presentationml/2006/main">
+  <p:cSld>
+    <p:spTree>
+      <p:nvGrpSpPr>
+        <p:cNvPr id="1" name=""/>
+        <p:cNvGrpSpPr/>
+        <p:nvPr/>
+      </p:nvGrpSpPr>
+      <p:grpSpPr>
+        <a:xfrm>
+          <a:off x="0" y="0"/>
+          <a:ext cx="0" cy="0"/>
+          <a:chOff x="0" y="0"/>
+          <a:chExt cx="0" cy="0"/>
+        </a:xfrm>
+      </p:grpSpPr>
+      <p:sp>
+        <p:nvSpPr>
+          <p:cNvPr id="2" name="Titel 1">
+            <a:extLst>
+              <a:ext uri="{FF2B5EF4-FFF2-40B4-BE49-F238E27FC236}">
+                <a16:creationId xmlns:a16="http://schemas.microsoft.com/office/drawing/2014/main" id="{AF43678F-4570-45BA-BCDA-8D84F210EC9E}"/>
+              </a:ext>
+            </a:extLst>
+          </p:cNvPr>
+          <p:cNvSpPr>
+            <a:spLocks noGrp="1"/>
+          </p:cNvSpPr>
+          <p:nvPr>
+            <p:ph type="title"/>
+          </p:nvPr>
+        </p:nvSpPr>
+        <p:spPr/>
+        <p:txBody>
+          <a:bodyPr/>
+          <a:lstStyle/>
+          <a:p>
+            <a:r>
+              <a:rPr lang="de-DE" dirty="0"/>
+              <a:t>Bridge Pattern</a:t>
+            </a:r>
+          </a:p>
+        </p:txBody>
+      </p:sp>
+      <p:pic>
+        <p:nvPicPr>
+          <p:cNvPr id="8" name="Inhaltsplatzhalter 7">
+            <a:extLst>
+              <a:ext uri="{FF2B5EF4-FFF2-40B4-BE49-F238E27FC236}">
+                <a16:creationId xmlns:a16="http://schemas.microsoft.com/office/drawing/2014/main" id="{CBFCE395-E6B9-4659-BCFE-61B7321034E2}"/>
+              </a:ext>
+            </a:extLst>
+          </p:cNvPr>
+          <p:cNvPicPr>
+            <a:picLocks noGrp="1" noChangeAspect="1"/>
+          </p:cNvPicPr>
+          <p:nvPr>
+            <p:ph idx="1"/>
+          </p:nvPr>
+        </p:nvPicPr>
+        <p:blipFill>
+          <a:blip r:embed="rId2">
+            <a:extLst>
+              <a:ext uri="{28A0092B-C50C-407E-A947-70E740481C1C}">
+                <a14:useLocalDpi xmlns:a14="http://schemas.microsoft.com/office/drawing/2010/main" val="0"/>
+              </a:ext>
+            </a:extLst>
+          </a:blip>
+          <a:stretch>
+            <a:fillRect/>
+          </a:stretch>
+        </p:blipFill>
+        <p:spPr>
+          <a:xfrm>
+            <a:off x="2343342" y="1302026"/>
+            <a:ext cx="7510048" cy="5006699"/>
+          </a:xfrm>
+        </p:spPr>
+      </p:pic>
+      <p:sp>
+        <p:nvSpPr>
+          <p:cNvPr id="4" name="Datumsplatzhalter 3">
+            <a:extLst>
+              <a:ext uri="{FF2B5EF4-FFF2-40B4-BE49-F238E27FC236}">
+                <a16:creationId xmlns:a16="http://schemas.microsoft.com/office/drawing/2014/main" id="{9627AF82-D3CC-4E08-AA24-8C45E29A6FE2}"/>
+              </a:ext>
+            </a:extLst>
+          </p:cNvPr>
+          <p:cNvSpPr>
+            <a:spLocks noGrp="1"/>
+          </p:cNvSpPr>
+          <p:nvPr>
+            <p:ph type="dt" sz="half" idx="10"/>
+          </p:nvPr>
+        </p:nvSpPr>
+        <p:spPr/>
+        <p:txBody>
+          <a:bodyPr/>
+          <a:lstStyle/>
+          <a:p>
+            <a:pPr algn="ctr"/>
+            <a:r>
+              <a:rPr lang="de-DE"/>
+              <a:t>SS 2017</a:t>
+            </a:r>
+            <a:endParaRPr lang="en-US" dirty="0"/>
+          </a:p>
+        </p:txBody>
+      </p:sp>
+      <p:sp>
+        <p:nvSpPr>
+          <p:cNvPr id="5" name="Foliennummernplatzhalter 4">
+            <a:extLst>
+              <a:ext uri="{FF2B5EF4-FFF2-40B4-BE49-F238E27FC236}">
+                <a16:creationId xmlns:a16="http://schemas.microsoft.com/office/drawing/2014/main" id="{E08BF146-D2B6-4D87-BA52-4A53FD1B560C}"/>
+              </a:ext>
+            </a:extLst>
+          </p:cNvPr>
+          <p:cNvSpPr>
+            <a:spLocks noGrp="1"/>
+          </p:cNvSpPr>
+          <p:nvPr>
+            <p:ph type="sldNum" sz="quarter" idx="12"/>
+          </p:nvPr>
+        </p:nvSpPr>
+        <p:spPr/>
+        <p:txBody>
+          <a:bodyPr/>
+          <a:lstStyle/>
+          <a:p>
+            <a:fld id="{B169C2F2-EDB3-4FE6-84CD-3C84FADA21DC}" type="slidenum">
+              <a:rPr lang="en-US" smtClean="0"/>
+              <a:pPr/>
+              <a:t>5</a:t>
+            </a:fld>
+            <a:endParaRPr lang="en-US" dirty="0"/>
+          </a:p>
+        </p:txBody>
+      </p:sp>
+      <p:sp>
+        <p:nvSpPr>
+          <p:cNvPr id="6" name="Fußzeilenplatzhalter 5">
+            <a:extLst>
+              <a:ext uri="{FF2B5EF4-FFF2-40B4-BE49-F238E27FC236}">
+                <a16:creationId xmlns:a16="http://schemas.microsoft.com/office/drawing/2014/main" id="{5335DE38-DC79-4B9F-A4CF-D62A01688629}"/>
+              </a:ext>
+            </a:extLst>
+          </p:cNvPr>
+          <p:cNvSpPr>
+            <a:spLocks noGrp="1"/>
+          </p:cNvSpPr>
+          <p:nvPr>
+            <p:ph type="ftr" sz="quarter" idx="3"/>
+          </p:nvPr>
+        </p:nvSpPr>
+        <p:spPr/>
+        <p:txBody>
+          <a:bodyPr/>
+          <a:lstStyle/>
+          <a:p>
+            <a:r>
+              <a:rPr lang="en-US"/>
+              <a:t>Chapter / Lecture Title</a:t>
+            </a:r>
+            <a:endParaRPr lang="en-US" dirty="0"/>
+          </a:p>
+        </p:txBody>
+      </p:sp>
+    </p:spTree>
+    <p:extLst>
+      <p:ext uri="{BB962C8B-B14F-4D97-AF65-F5344CB8AC3E}">
+        <p14:creationId xmlns:p14="http://schemas.microsoft.com/office/powerpoint/2010/main" val="922624707"/>
+      </p:ext>
+    </p:extLst>
+  </p:cSld>
+  <p:clrMapOvr>
+    <a:masterClrMapping/>
+  </p:clrMapOvr>
+</p:sld>
+</file>
+
+<file path=ppt/slides/slide6.xml><?xml version="1.0" encoding="utf-8"?>
+<p:sld xmlns:a="http://schemas.openxmlformats.org/drawingml/2006/main" xmlns:r="http://schemas.openxmlformats.org/officeDocument/2006/relationships" xmlns:p="http://schemas.openxmlformats.org/presentationml/2006/main">
+  <p:cSld>
+    <p:spTree>
+      <p:nvGrpSpPr>
+        <p:cNvPr id="1" name=""/>
+        <p:cNvGrpSpPr/>
+        <p:nvPr/>
+      </p:nvGrpSpPr>
+      <p:grpSpPr>
+        <a:xfrm>
+          <a:off x="0" y="0"/>
+          <a:ext cx="0" cy="0"/>
+          <a:chOff x="0" y="0"/>
+          <a:chExt cx="0" cy="0"/>
+        </a:xfrm>
+      </p:grpSpPr>
+      <p:sp>
+        <p:nvSpPr>
+          <p:cNvPr id="2" name="Titel 1">
+            <a:extLst>
+              <a:ext uri="{FF2B5EF4-FFF2-40B4-BE49-F238E27FC236}">
+                <a16:creationId xmlns:a16="http://schemas.microsoft.com/office/drawing/2014/main" id="{AF43678F-4570-45BA-BCDA-8D84F210EC9E}"/>
+              </a:ext>
+            </a:extLst>
+          </p:cNvPr>
+          <p:cNvSpPr>
+            <a:spLocks noGrp="1"/>
+          </p:cNvSpPr>
+          <p:nvPr>
+            <p:ph type="title"/>
+          </p:nvPr>
+        </p:nvSpPr>
+        <p:spPr/>
+        <p:txBody>
+          <a:bodyPr/>
+          <a:lstStyle/>
+          <a:p>
+            <a:r>
+              <a:rPr lang="de-DE" dirty="0"/>
+              <a:t>Bridge Pattern</a:t>
+            </a:r>
+          </a:p>
+        </p:txBody>
+      </p:sp>
+      <p:sp>
+        <p:nvSpPr>
+          <p:cNvPr id="3" name="Inhaltsplatzhalter 2">
+            <a:extLst>
+              <a:ext uri="{FF2B5EF4-FFF2-40B4-BE49-F238E27FC236}">
+                <a16:creationId xmlns:a16="http://schemas.microsoft.com/office/drawing/2014/main" id="{AFF56B4A-889F-4346-820D-5ACF369D4A92}"/>
+              </a:ext>
+            </a:extLst>
+          </p:cNvPr>
+          <p:cNvSpPr>
+            <a:spLocks noGrp="1"/>
+          </p:cNvSpPr>
+          <p:nvPr>
+            <p:ph idx="1"/>
+          </p:nvPr>
+        </p:nvSpPr>
+        <p:spPr/>
+        <p:txBody>
+          <a:bodyPr/>
+          <a:lstStyle/>
+          <a:p>
+            <a:r>
+              <a:rPr lang="de-DE" dirty="0" err="1"/>
+              <a:t>Allows</a:t>
+            </a:r>
+            <a:r>
+              <a:rPr lang="de-DE" dirty="0"/>
+              <a:t> </a:t>
+            </a:r>
+            <a:r>
+              <a:rPr lang="de-DE" dirty="0" err="1"/>
+              <a:t>to</a:t>
+            </a:r>
+            <a:r>
+              <a:rPr lang="de-DE" dirty="0"/>
+              <a:t> </a:t>
+            </a:r>
+            <a:r>
+              <a:rPr lang="de-DE" dirty="0" err="1"/>
+              <a:t>delay</a:t>
+            </a:r>
+            <a:r>
+              <a:rPr lang="de-DE" dirty="0"/>
+              <a:t> </a:t>
+            </a:r>
+            <a:r>
+              <a:rPr lang="de-DE" dirty="0" err="1"/>
+              <a:t>assignment</a:t>
+            </a:r>
+            <a:r>
+              <a:rPr lang="de-DE" dirty="0"/>
+              <a:t> </a:t>
+            </a:r>
+            <a:r>
+              <a:rPr lang="de-DE" dirty="0" err="1"/>
+              <a:t>of</a:t>
+            </a:r>
+            <a:r>
+              <a:rPr lang="de-DE" dirty="0"/>
+              <a:t> an </a:t>
+            </a:r>
+            <a:r>
+              <a:rPr lang="de-DE" dirty="0" err="1"/>
+              <a:t>implementation</a:t>
+            </a:r>
+            <a:r>
+              <a:rPr lang="de-DE" dirty="0"/>
+              <a:t> </a:t>
+            </a:r>
+            <a:r>
+              <a:rPr lang="de-DE" dirty="0" err="1"/>
+              <a:t>of</a:t>
+            </a:r>
+            <a:r>
+              <a:rPr lang="de-DE" dirty="0"/>
+              <a:t> an </a:t>
+            </a:r>
+            <a:r>
+              <a:rPr lang="de-DE" dirty="0" err="1"/>
+              <a:t>interface</a:t>
+            </a:r>
+            <a:r>
+              <a:rPr lang="de-DE" dirty="0"/>
+              <a:t> </a:t>
+            </a:r>
+            <a:r>
+              <a:rPr lang="de-DE" dirty="0" err="1"/>
+              <a:t>from</a:t>
+            </a:r>
+            <a:r>
+              <a:rPr lang="de-DE" dirty="0"/>
+              <a:t> </a:t>
+            </a:r>
+            <a:r>
+              <a:rPr lang="de-DE" dirty="0" err="1"/>
+              <a:t>compile</a:t>
+            </a:r>
+            <a:r>
+              <a:rPr lang="de-DE" dirty="0"/>
+              <a:t> </a:t>
+            </a:r>
+            <a:r>
+              <a:rPr lang="de-DE" dirty="0" err="1"/>
+              <a:t>to</a:t>
+            </a:r>
+            <a:r>
+              <a:rPr lang="de-DE" dirty="0"/>
+              <a:t> </a:t>
+            </a:r>
+            <a:r>
+              <a:rPr lang="de-DE" dirty="0" err="1"/>
+              <a:t>runtime</a:t>
+            </a:r>
+            <a:endParaRPr lang="de-DE" dirty="0"/>
+          </a:p>
+          <a:p>
+            <a:r>
+              <a:rPr lang="de-DE" dirty="0" err="1"/>
+              <a:t>Degenerated</a:t>
+            </a:r>
+            <a:r>
+              <a:rPr lang="de-DE" dirty="0"/>
+              <a:t> Bridge </a:t>
+            </a:r>
+            <a:r>
+              <a:rPr lang="de-DE" dirty="0" err="1"/>
+              <a:t>is</a:t>
+            </a:r>
+            <a:r>
+              <a:rPr lang="de-DE" dirty="0"/>
+              <a:t> </a:t>
+            </a:r>
+            <a:r>
+              <a:rPr lang="de-DE" dirty="0" err="1"/>
+              <a:t>the</a:t>
+            </a:r>
+            <a:r>
+              <a:rPr lang="de-DE" dirty="0"/>
+              <a:t> same </a:t>
+            </a:r>
+            <a:r>
+              <a:rPr lang="de-DE" dirty="0" err="1"/>
+              <a:t>without</a:t>
+            </a:r>
+            <a:r>
+              <a:rPr lang="de-DE" dirty="0"/>
+              <a:t> </a:t>
+            </a:r>
+            <a:r>
+              <a:rPr lang="de-DE" dirty="0" err="1"/>
+              <a:t>taxonomy</a:t>
+            </a:r>
+            <a:r>
+              <a:rPr lang="de-DE" dirty="0"/>
+              <a:t> in </a:t>
+            </a:r>
+            <a:r>
+              <a:rPr lang="de-DE" dirty="0" err="1"/>
+              <a:t>application</a:t>
+            </a:r>
+            <a:r>
+              <a:rPr lang="de-DE" dirty="0"/>
+              <a:t> </a:t>
+            </a:r>
+            <a:r>
+              <a:rPr lang="de-DE" dirty="0" err="1"/>
+              <a:t>domain</a:t>
+            </a:r>
+            <a:endParaRPr lang="de-DE" dirty="0"/>
+          </a:p>
+          <a:p>
+            <a:r>
+              <a:rPr lang="de-DE" dirty="0" err="1"/>
+              <a:t>Used</a:t>
+            </a:r>
+            <a:r>
+              <a:rPr lang="de-DE" dirty="0"/>
+              <a:t> </a:t>
+            </a:r>
+            <a:r>
+              <a:rPr lang="de-DE" dirty="0" err="1"/>
+              <a:t>to</a:t>
+            </a:r>
+            <a:r>
+              <a:rPr lang="de-DE" dirty="0"/>
+              <a:t> </a:t>
+            </a:r>
+            <a:r>
+              <a:rPr lang="de-DE" dirty="0" err="1"/>
+              <a:t>test</a:t>
+            </a:r>
+            <a:r>
+              <a:rPr lang="de-DE" dirty="0"/>
+              <a:t> </a:t>
+            </a:r>
+            <a:r>
+              <a:rPr lang="de-DE" dirty="0" err="1"/>
+              <a:t>application</a:t>
+            </a:r>
+            <a:r>
+              <a:rPr lang="de-DE" dirty="0"/>
+              <a:t> </a:t>
+            </a:r>
+            <a:r>
+              <a:rPr lang="de-DE" dirty="0" err="1"/>
+              <a:t>with</a:t>
+            </a:r>
+            <a:r>
+              <a:rPr lang="de-DE" dirty="0"/>
+              <a:t> </a:t>
+            </a:r>
+            <a:r>
+              <a:rPr lang="de-DE" dirty="0" err="1"/>
+              <a:t>mocks</a:t>
+            </a:r>
+            <a:r>
+              <a:rPr lang="de-DE" dirty="0"/>
+              <a:t> (e.g. </a:t>
+            </a:r>
+            <a:r>
+              <a:rPr lang="de-DE" dirty="0" err="1"/>
+              <a:t>component</a:t>
+            </a:r>
+            <a:r>
+              <a:rPr lang="de-DE" dirty="0"/>
+              <a:t> not </a:t>
+            </a:r>
+            <a:r>
+              <a:rPr lang="de-DE" dirty="0" err="1"/>
+              <a:t>yet</a:t>
+            </a:r>
+            <a:r>
+              <a:rPr lang="de-DE" dirty="0"/>
+              <a:t> </a:t>
+            </a:r>
+            <a:r>
+              <a:rPr lang="de-DE" dirty="0" err="1"/>
+              <a:t>implemented</a:t>
+            </a:r>
+            <a:r>
+              <a:rPr lang="de-DE" dirty="0"/>
+              <a:t>..)</a:t>
+            </a:r>
+          </a:p>
+          <a:p>
+            <a:r>
+              <a:rPr lang="de-DE" dirty="0" err="1"/>
+              <a:t>Or</a:t>
+            </a:r>
+            <a:r>
+              <a:rPr lang="de-DE" dirty="0"/>
+              <a:t> support multiple </a:t>
+            </a:r>
+            <a:r>
+              <a:rPr lang="de-DE" dirty="0" err="1"/>
+              <a:t>vendors</a:t>
+            </a:r>
+            <a:r>
+              <a:rPr lang="de-DE" dirty="0"/>
+              <a:t> </a:t>
+            </a:r>
+            <a:r>
+              <a:rPr lang="de-DE" dirty="0" err="1"/>
+              <a:t>of</a:t>
+            </a:r>
+            <a:r>
+              <a:rPr lang="de-DE" dirty="0"/>
+              <a:t> a </a:t>
+            </a:r>
+            <a:r>
+              <a:rPr lang="de-DE" dirty="0" err="1"/>
+              <a:t>specific</a:t>
+            </a:r>
+            <a:r>
+              <a:rPr lang="de-DE" dirty="0"/>
+              <a:t> </a:t>
+            </a:r>
+            <a:r>
+              <a:rPr lang="de-DE" dirty="0" err="1"/>
+              <a:t>service</a:t>
+            </a:r>
+            <a:r>
+              <a:rPr lang="de-DE" dirty="0"/>
+              <a:t> (e.g. Database </a:t>
+            </a:r>
+            <a:r>
+              <a:rPr lang="de-DE" dirty="0" err="1"/>
+              <a:t>vendors</a:t>
+            </a:r>
+            <a:r>
+              <a:rPr lang="de-DE" dirty="0"/>
+              <a:t>..)</a:t>
+            </a:r>
+          </a:p>
+          <a:p>
+            <a:r>
+              <a:rPr lang="de-DE" dirty="0" err="1"/>
+              <a:t>Used</a:t>
+            </a:r>
+            <a:r>
+              <a:rPr lang="de-DE" dirty="0"/>
+              <a:t> </a:t>
+            </a:r>
+            <a:r>
+              <a:rPr lang="de-DE" dirty="0" err="1"/>
+              <a:t>up</a:t>
+            </a:r>
+            <a:r>
+              <a:rPr lang="de-DE" dirty="0"/>
+              <a:t>-front in a design </a:t>
+            </a:r>
+            <a:r>
+              <a:rPr lang="de-DE" dirty="0" err="1"/>
+              <a:t>to</a:t>
+            </a:r>
+            <a:r>
+              <a:rPr lang="de-DE" dirty="0"/>
+              <a:t> </a:t>
+            </a:r>
+            <a:r>
+              <a:rPr lang="de-DE" dirty="0" err="1"/>
+              <a:t>let</a:t>
+            </a:r>
+            <a:r>
+              <a:rPr lang="de-DE" dirty="0"/>
+              <a:t> </a:t>
+            </a:r>
+            <a:r>
+              <a:rPr lang="de-DE" dirty="0" err="1"/>
+              <a:t>abstractions</a:t>
+            </a:r>
+            <a:r>
+              <a:rPr lang="de-DE" dirty="0"/>
+              <a:t> and </a:t>
+            </a:r>
+            <a:r>
+              <a:rPr lang="de-DE" dirty="0" err="1"/>
+              <a:t>implementations</a:t>
+            </a:r>
+            <a:r>
+              <a:rPr lang="de-DE" dirty="0"/>
+              <a:t> </a:t>
+            </a:r>
+            <a:r>
+              <a:rPr lang="de-DE" dirty="0" err="1"/>
+              <a:t>vary</a:t>
+            </a:r>
+            <a:r>
+              <a:rPr lang="de-DE" dirty="0"/>
+              <a:t> </a:t>
+            </a:r>
+            <a:r>
+              <a:rPr lang="de-DE" dirty="0" err="1"/>
+              <a:t>independently</a:t>
+            </a:r>
+            <a:endParaRPr lang="de-DE" dirty="0"/>
+          </a:p>
+        </p:txBody>
+      </p:sp>
+      <p:sp>
+        <p:nvSpPr>
+          <p:cNvPr id="4" name="Datumsplatzhalter 3">
+            <a:extLst>
+              <a:ext uri="{FF2B5EF4-FFF2-40B4-BE49-F238E27FC236}">
+                <a16:creationId xmlns:a16="http://schemas.microsoft.com/office/drawing/2014/main" id="{9627AF82-D3CC-4E08-AA24-8C45E29A6FE2}"/>
+              </a:ext>
+            </a:extLst>
+          </p:cNvPr>
+          <p:cNvSpPr>
+            <a:spLocks noGrp="1"/>
+          </p:cNvSpPr>
+          <p:nvPr>
+            <p:ph type="dt" sz="half" idx="10"/>
+          </p:nvPr>
+        </p:nvSpPr>
+        <p:spPr/>
+        <p:txBody>
+          <a:bodyPr/>
+          <a:lstStyle/>
+          <a:p>
+            <a:pPr algn="ctr"/>
+            <a:r>
+              <a:rPr lang="de-DE"/>
+              <a:t>SS 2017</a:t>
+            </a:r>
+            <a:endParaRPr lang="en-US" dirty="0"/>
+          </a:p>
+        </p:txBody>
+      </p:sp>
+      <p:sp>
+        <p:nvSpPr>
+          <p:cNvPr id="5" name="Foliennummernplatzhalter 4">
+            <a:extLst>
+              <a:ext uri="{FF2B5EF4-FFF2-40B4-BE49-F238E27FC236}">
+                <a16:creationId xmlns:a16="http://schemas.microsoft.com/office/drawing/2014/main" id="{E08BF146-D2B6-4D87-BA52-4A53FD1B560C}"/>
+              </a:ext>
+            </a:extLst>
+          </p:cNvPr>
+          <p:cNvSpPr>
+            <a:spLocks noGrp="1"/>
+          </p:cNvSpPr>
+          <p:nvPr>
+            <p:ph type="sldNum" sz="quarter" idx="12"/>
+          </p:nvPr>
+        </p:nvSpPr>
+        <p:spPr/>
+        <p:txBody>
+          <a:bodyPr/>
+          <a:lstStyle/>
+          <a:p>
+            <a:fld id="{B169C2F2-EDB3-4FE6-84CD-3C84FADA21DC}" type="slidenum">
+              <a:rPr lang="en-US" smtClean="0"/>
+              <a:pPr/>
+              <a:t>6</a:t>
+            </a:fld>
+            <a:endParaRPr lang="en-US" dirty="0"/>
+          </a:p>
+        </p:txBody>
+      </p:sp>
+      <p:sp>
+        <p:nvSpPr>
+          <p:cNvPr id="6" name="Fußzeilenplatzhalter 5">
+            <a:extLst>
+              <a:ext uri="{FF2B5EF4-FFF2-40B4-BE49-F238E27FC236}">
+                <a16:creationId xmlns:a16="http://schemas.microsoft.com/office/drawing/2014/main" id="{5335DE38-DC79-4B9F-A4CF-D62A01688629}"/>
+              </a:ext>
+            </a:extLst>
+          </p:cNvPr>
+          <p:cNvSpPr>
+            <a:spLocks noGrp="1"/>
+          </p:cNvSpPr>
+          <p:nvPr>
+            <p:ph type="ftr" sz="quarter" idx="3"/>
+          </p:nvPr>
+        </p:nvSpPr>
+        <p:spPr/>
+        <p:txBody>
+          <a:bodyPr/>
+          <a:lstStyle/>
+          <a:p>
+            <a:r>
+              <a:rPr lang="en-US"/>
+              <a:t>Chapter / Lecture Title</a:t>
+            </a:r>
+            <a:endParaRPr lang="en-US" dirty="0"/>
+          </a:p>
+        </p:txBody>
+      </p:sp>
+    </p:spTree>
+    <p:extLst>
+      <p:ext uri="{BB962C8B-B14F-4D97-AF65-F5344CB8AC3E}">
+        <p14:creationId xmlns:p14="http://schemas.microsoft.com/office/powerpoint/2010/main" val="3642446604"/>
+      </p:ext>
+    </p:extLst>
+  </p:cSld>
+  <p:clrMapOvr>
+    <a:masterClrMapping/>
+  </p:clrMapOvr>
+</p:sld>
+</file>
+
+<file path=ppt/slides/slide7.xml><?xml version="1.0" encoding="utf-8"?>
+<p:sld xmlns:a="http://schemas.openxmlformats.org/drawingml/2006/main" xmlns:r="http://schemas.openxmlformats.org/officeDocument/2006/relationships" xmlns:p="http://schemas.openxmlformats.org/presentationml/2006/main">
+  <p:cSld>
+    <p:spTree>
+      <p:nvGrpSpPr>
+        <p:cNvPr id="1" name=""/>
+        <p:cNvGrpSpPr/>
+        <p:nvPr/>
+      </p:nvGrpSpPr>
+      <p:grpSpPr>
+        <a:xfrm>
+          <a:off x="0" y="0"/>
+          <a:ext cx="0" cy="0"/>
+          <a:chOff x="0" y="0"/>
+          <a:chExt cx="0" cy="0"/>
+        </a:xfrm>
+      </p:grpSpPr>
+      <p:sp>
+        <p:nvSpPr>
+          <p:cNvPr id="2" name="Titel 1">
+            <a:extLst>
+              <a:ext uri="{FF2B5EF4-FFF2-40B4-BE49-F238E27FC236}">
+                <a16:creationId xmlns:a16="http://schemas.microsoft.com/office/drawing/2014/main" id="{B1B3080E-B441-4F48-9091-55440BAA5EFD}"/>
+              </a:ext>
+            </a:extLst>
+          </p:cNvPr>
+          <p:cNvSpPr>
+            <a:spLocks noGrp="1"/>
+          </p:cNvSpPr>
+          <p:nvPr>
+            <p:ph type="title"/>
+          </p:nvPr>
+        </p:nvSpPr>
+        <p:spPr/>
+        <p:txBody>
+          <a:bodyPr/>
+          <a:lstStyle/>
+          <a:p>
+            <a:r>
+              <a:rPr lang="de-DE" dirty="0"/>
+              <a:t>Proxy Pattern</a:t>
+            </a:r>
+          </a:p>
+        </p:txBody>
+      </p:sp>
+      <p:sp>
+        <p:nvSpPr>
+          <p:cNvPr id="4" name="Datumsplatzhalter 3">
+            <a:extLst>
+              <a:ext uri="{FF2B5EF4-FFF2-40B4-BE49-F238E27FC236}">
+                <a16:creationId xmlns:a16="http://schemas.microsoft.com/office/drawing/2014/main" id="{FE7A300A-8353-415E-B190-BEA252D90012}"/>
+              </a:ext>
+            </a:extLst>
+          </p:cNvPr>
+          <p:cNvSpPr>
+            <a:spLocks noGrp="1"/>
+          </p:cNvSpPr>
+          <p:nvPr>
+            <p:ph type="dt" sz="half" idx="10"/>
+          </p:nvPr>
+        </p:nvSpPr>
+        <p:spPr/>
+        <p:txBody>
+          <a:bodyPr/>
+          <a:lstStyle/>
+          <a:p>
+            <a:pPr algn="ctr"/>
+            <a:r>
+              <a:rPr lang="de-DE"/>
+              <a:t>SS 2017</a:t>
+            </a:r>
+            <a:endParaRPr lang="en-US" dirty="0"/>
+          </a:p>
+        </p:txBody>
+      </p:sp>
+      <p:sp>
+        <p:nvSpPr>
+          <p:cNvPr id="5" name="Foliennummernplatzhalter 4">
+            <a:extLst>
+              <a:ext uri="{FF2B5EF4-FFF2-40B4-BE49-F238E27FC236}">
+                <a16:creationId xmlns:a16="http://schemas.microsoft.com/office/drawing/2014/main" id="{0B2D5DB3-F417-4F22-AA45-E463F0C5F3E8}"/>
+              </a:ext>
+            </a:extLst>
+          </p:cNvPr>
+          <p:cNvSpPr>
+            <a:spLocks noGrp="1"/>
+          </p:cNvSpPr>
+          <p:nvPr>
+            <p:ph type="sldNum" sz="quarter" idx="12"/>
+          </p:nvPr>
+        </p:nvSpPr>
+        <p:spPr/>
+        <p:txBody>
+          <a:bodyPr/>
+          <a:lstStyle/>
+          <a:p>
+            <a:fld id="{B169C2F2-EDB3-4FE6-84CD-3C84FADA21DC}" type="slidenum">
+              <a:rPr lang="en-US" smtClean="0"/>
+              <a:pPr/>
+              <a:t>7</a:t>
+            </a:fld>
+            <a:endParaRPr lang="en-US" dirty="0"/>
+          </a:p>
+        </p:txBody>
+      </p:sp>
+      <p:sp>
+        <p:nvSpPr>
+          <p:cNvPr id="6" name="Fußzeilenplatzhalter 5">
+            <a:extLst>
+              <a:ext uri="{FF2B5EF4-FFF2-40B4-BE49-F238E27FC236}">
+                <a16:creationId xmlns:a16="http://schemas.microsoft.com/office/drawing/2014/main" id="{51CE27C4-6396-4415-84B7-4A2494392E2C}"/>
+              </a:ext>
+            </a:extLst>
+          </p:cNvPr>
+          <p:cNvSpPr>
+            <a:spLocks noGrp="1"/>
+          </p:cNvSpPr>
+          <p:nvPr>
+            <p:ph type="ftr" sz="quarter" idx="3"/>
+          </p:nvPr>
+        </p:nvSpPr>
+        <p:spPr/>
+        <p:txBody>
+          <a:bodyPr/>
+          <a:lstStyle/>
+          <a:p>
+            <a:r>
+              <a:rPr lang="en-US"/>
+              <a:t>Chapter / Lecture Title</a:t>
+            </a:r>
+            <a:endParaRPr lang="en-US" dirty="0"/>
+          </a:p>
+        </p:txBody>
+      </p:sp>
+      <p:sp>
+        <p:nvSpPr>
+          <p:cNvPr id="7" name="Textplatzhalter 6">
+            <a:extLst>
+              <a:ext uri="{FF2B5EF4-FFF2-40B4-BE49-F238E27FC236}">
+                <a16:creationId xmlns:a16="http://schemas.microsoft.com/office/drawing/2014/main" id="{A83EF661-83CC-445D-A8F6-3A49548C408F}"/>
+              </a:ext>
+            </a:extLst>
+          </p:cNvPr>
+          <p:cNvSpPr>
+            <a:spLocks noGrp="1"/>
+          </p:cNvSpPr>
+          <p:nvPr>
+            <p:ph type="body" sz="quarter" idx="13"/>
+          </p:nvPr>
+        </p:nvSpPr>
+        <p:spPr/>
+        <p:txBody>
+          <a:bodyPr/>
+          <a:lstStyle/>
+          <a:p>
+            <a:r>
+              <a:rPr lang="de-DE" dirty="0"/>
+              <a:t>The </a:t>
+            </a:r>
+            <a:r>
+              <a:rPr lang="de-DE" dirty="0" err="1"/>
+              <a:t>client</a:t>
+            </a:r>
+            <a:r>
+              <a:rPr lang="de-DE" dirty="0"/>
+              <a:t> </a:t>
+            </a:r>
+            <a:r>
+              <a:rPr lang="de-DE" dirty="0" err="1"/>
+              <a:t>never</a:t>
+            </a:r>
+            <a:r>
+              <a:rPr lang="de-DE" dirty="0"/>
+              <a:t> </a:t>
+            </a:r>
+            <a:r>
+              <a:rPr lang="de-DE" dirty="0" err="1"/>
+              <a:t>calls</a:t>
+            </a:r>
+            <a:r>
+              <a:rPr lang="de-DE" dirty="0"/>
+              <a:t> </a:t>
+            </a:r>
+            <a:r>
+              <a:rPr lang="de-DE" i="1" dirty="0" err="1"/>
+              <a:t>request</a:t>
+            </a:r>
+            <a:r>
+              <a:rPr lang="de-DE" i="1" dirty="0"/>
+              <a:t>() </a:t>
+            </a:r>
+            <a:r>
+              <a:rPr lang="de-DE" dirty="0"/>
+              <a:t>in </a:t>
+            </a:r>
+            <a:r>
+              <a:rPr lang="de-DE" i="1" dirty="0" err="1"/>
+              <a:t>RealSubject</a:t>
+            </a:r>
+            <a:r>
+              <a:rPr lang="de-DE" dirty="0"/>
+              <a:t>, </a:t>
+            </a:r>
+            <a:r>
+              <a:rPr lang="de-DE" dirty="0" err="1"/>
+              <a:t>instead</a:t>
+            </a:r>
+            <a:r>
+              <a:rPr lang="de-DE" dirty="0"/>
+              <a:t> </a:t>
+            </a:r>
+            <a:r>
+              <a:rPr lang="de-DE" dirty="0" err="1"/>
+              <a:t>it</a:t>
+            </a:r>
+            <a:r>
+              <a:rPr lang="de-DE" dirty="0"/>
+              <a:t> </a:t>
+            </a:r>
+            <a:r>
+              <a:rPr lang="de-DE" dirty="0" err="1"/>
+              <a:t>always</a:t>
+            </a:r>
+            <a:r>
+              <a:rPr lang="de-DE" dirty="0"/>
+              <a:t> </a:t>
+            </a:r>
+            <a:r>
+              <a:rPr lang="de-DE" dirty="0" err="1"/>
+              <a:t>calls</a:t>
+            </a:r>
+            <a:r>
+              <a:rPr lang="de-DE" dirty="0"/>
+              <a:t> </a:t>
+            </a:r>
+            <a:r>
+              <a:rPr lang="de-DE" dirty="0" err="1"/>
+              <a:t>the</a:t>
+            </a:r>
+            <a:r>
+              <a:rPr lang="de-DE" dirty="0"/>
+              <a:t> </a:t>
+            </a:r>
+            <a:r>
+              <a:rPr lang="de-DE" dirty="0" err="1"/>
+              <a:t>method</a:t>
+            </a:r>
+            <a:r>
+              <a:rPr lang="de-DE" dirty="0"/>
+              <a:t> in </a:t>
+            </a:r>
+            <a:r>
+              <a:rPr lang="de-DE" i="1" dirty="0"/>
+              <a:t>Proxy </a:t>
+            </a:r>
+            <a:r>
+              <a:rPr lang="de-DE" dirty="0" err="1"/>
+              <a:t>which</a:t>
+            </a:r>
+            <a:r>
+              <a:rPr lang="de-DE" dirty="0"/>
+              <a:t> </a:t>
+            </a:r>
+            <a:r>
+              <a:rPr lang="de-DE" dirty="0" err="1"/>
+              <a:t>might</a:t>
+            </a:r>
+            <a:r>
+              <a:rPr lang="de-DE" dirty="0"/>
+              <a:t> </a:t>
+            </a:r>
+            <a:r>
+              <a:rPr lang="de-DE" dirty="0" err="1"/>
+              <a:t>delegate</a:t>
+            </a:r>
+            <a:r>
+              <a:rPr lang="de-DE" dirty="0"/>
+              <a:t> </a:t>
+            </a:r>
+            <a:r>
+              <a:rPr lang="de-DE" dirty="0" err="1"/>
+              <a:t>it</a:t>
+            </a:r>
+            <a:r>
+              <a:rPr lang="de-DE" dirty="0"/>
+              <a:t> </a:t>
+            </a:r>
+            <a:r>
+              <a:rPr lang="de-DE" dirty="0" err="1"/>
+              <a:t>to</a:t>
+            </a:r>
+            <a:r>
+              <a:rPr lang="de-DE" dirty="0"/>
+              <a:t> </a:t>
+            </a:r>
+            <a:r>
+              <a:rPr lang="de-DE" i="1" dirty="0" err="1"/>
+              <a:t>RealSubject</a:t>
+            </a:r>
+            <a:endParaRPr lang="de-DE" dirty="0"/>
+          </a:p>
+        </p:txBody>
+      </p:sp>
+      <p:pic>
+        <p:nvPicPr>
+          <p:cNvPr id="8" name="Inhaltsplatzhalter 7">
+            <a:extLst>
+              <a:ext uri="{FF2B5EF4-FFF2-40B4-BE49-F238E27FC236}">
+                <a16:creationId xmlns:a16="http://schemas.microsoft.com/office/drawing/2014/main" id="{6AF8D752-7D71-4AC4-8A1E-49A3C610A00C}"/>
+              </a:ext>
+            </a:extLst>
+          </p:cNvPr>
+          <p:cNvPicPr>
+            <a:picLocks noGrp="1" noChangeAspect="1"/>
+          </p:cNvPicPr>
+          <p:nvPr>
+            <p:ph idx="1"/>
+          </p:nvPr>
+        </p:nvPicPr>
+        <p:blipFill>
+          <a:blip r:embed="rId2">
+            <a:extLst>
+              <a:ext uri="{28A0092B-C50C-407E-A947-70E740481C1C}">
+                <a14:useLocalDpi xmlns:a14="http://schemas.microsoft.com/office/drawing/2010/main" val="0"/>
+              </a:ext>
+            </a:extLst>
+          </a:blip>
+          <a:stretch>
+            <a:fillRect/>
+          </a:stretch>
+        </p:blipFill>
+        <p:spPr>
+          <a:xfrm>
+            <a:off x="829333" y="1729818"/>
+            <a:ext cx="10533333" cy="3780952"/>
+          </a:xfrm>
+        </p:spPr>
+      </p:pic>
+    </p:spTree>
+    <p:extLst>
+      <p:ext uri="{BB962C8B-B14F-4D97-AF65-F5344CB8AC3E}">
+        <p14:creationId xmlns:p14="http://schemas.microsoft.com/office/powerpoint/2010/main" val="3706626404"/>
+      </p:ext>
+    </p:extLst>
+  </p:cSld>
+  <p:clrMapOvr>
+    <a:masterClrMapping/>
+  </p:clrMapOvr>
+</p:sld>
+</file>
+
+<file path=ppt/slides/slide8.xml><?xml version="1.0" encoding="utf-8"?>
+<p:sld xmlns:a="http://schemas.openxmlformats.org/drawingml/2006/main" xmlns:r="http://schemas.openxmlformats.org/officeDocument/2006/relationships" xmlns:p="http://schemas.openxmlformats.org/presentationml/2006/main">
+  <p:cSld>
+    <p:spTree>
+      <p:nvGrpSpPr>
+        <p:cNvPr id="1" name=""/>
+        <p:cNvGrpSpPr/>
+        <p:nvPr/>
+      </p:nvGrpSpPr>
+      <p:grpSpPr>
+        <a:xfrm>
+          <a:off x="0" y="0"/>
+          <a:ext cx="0" cy="0"/>
+          <a:chOff x="0" y="0"/>
+          <a:chExt cx="0" cy="0"/>
+        </a:xfrm>
+      </p:grpSpPr>
+      <p:sp>
+        <p:nvSpPr>
+          <p:cNvPr id="2" name="Titel 1">
+            <a:extLst>
+              <a:ext uri="{FF2B5EF4-FFF2-40B4-BE49-F238E27FC236}">
+                <a16:creationId xmlns:a16="http://schemas.microsoft.com/office/drawing/2014/main" id="{8EE281A3-6C5E-4E73-A963-465158841A76}"/>
+              </a:ext>
+            </a:extLst>
+          </p:cNvPr>
+          <p:cNvSpPr>
+            <a:spLocks noGrp="1"/>
+          </p:cNvSpPr>
+          <p:nvPr>
+            <p:ph type="title"/>
+          </p:nvPr>
+        </p:nvSpPr>
+        <p:spPr/>
+        <p:txBody>
+          <a:bodyPr/>
+          <a:lstStyle/>
+          <a:p>
+            <a:r>
+              <a:rPr lang="de-DE" dirty="0"/>
+              <a:t>Proxy Pattern</a:t>
+            </a:r>
+          </a:p>
+        </p:txBody>
+      </p:sp>
+      <p:sp>
+        <p:nvSpPr>
+          <p:cNvPr id="3" name="Inhaltsplatzhalter 2">
+            <a:extLst>
+              <a:ext uri="{FF2B5EF4-FFF2-40B4-BE49-F238E27FC236}">
+                <a16:creationId xmlns:a16="http://schemas.microsoft.com/office/drawing/2014/main" id="{416E0D78-4731-417E-BED0-E4B62D1AA88D}"/>
+              </a:ext>
+            </a:extLst>
+          </p:cNvPr>
+          <p:cNvSpPr>
+            <a:spLocks noGrp="1"/>
+          </p:cNvSpPr>
+          <p:nvPr>
+            <p:ph idx="1"/>
+          </p:nvPr>
+        </p:nvSpPr>
+        <p:spPr/>
+        <p:txBody>
+          <a:bodyPr/>
+          <a:lstStyle/>
+          <a:p>
+            <a:r>
+              <a:rPr lang="de-DE" dirty="0" err="1"/>
+              <a:t>Allows</a:t>
+            </a:r>
+            <a:r>
+              <a:rPr lang="de-DE" dirty="0"/>
+              <a:t> </a:t>
+            </a:r>
+            <a:r>
+              <a:rPr lang="de-DE" dirty="0" err="1"/>
+              <a:t>to</a:t>
+            </a:r>
+            <a:r>
+              <a:rPr lang="de-DE" dirty="0"/>
+              <a:t> </a:t>
+            </a:r>
+            <a:r>
+              <a:rPr lang="de-DE" dirty="0" err="1"/>
+              <a:t>defer</a:t>
+            </a:r>
+            <a:r>
+              <a:rPr lang="de-DE" dirty="0"/>
+              <a:t> </a:t>
+            </a:r>
+            <a:r>
+              <a:rPr lang="de-DE" dirty="0" err="1"/>
+              <a:t>object</a:t>
+            </a:r>
+            <a:r>
+              <a:rPr lang="de-DE" dirty="0"/>
+              <a:t> </a:t>
+            </a:r>
+            <a:r>
+              <a:rPr lang="de-DE" dirty="0" err="1"/>
+              <a:t>creation</a:t>
+            </a:r>
+            <a:r>
+              <a:rPr lang="de-DE" dirty="0"/>
+              <a:t> and </a:t>
+            </a:r>
+            <a:r>
+              <a:rPr lang="de-DE" dirty="0" err="1"/>
+              <a:t>object</a:t>
+            </a:r>
+            <a:r>
+              <a:rPr lang="de-DE" dirty="0"/>
+              <a:t> </a:t>
+            </a:r>
+            <a:r>
+              <a:rPr lang="de-DE" dirty="0" err="1"/>
+              <a:t>initialization</a:t>
+            </a:r>
+            <a:r>
+              <a:rPr lang="de-DE" dirty="0"/>
+              <a:t> </a:t>
+            </a:r>
+            <a:r>
+              <a:rPr lang="de-DE" dirty="0" err="1"/>
+              <a:t>to</a:t>
+            </a:r>
+            <a:r>
+              <a:rPr lang="de-DE" dirty="0"/>
+              <a:t> </a:t>
+            </a:r>
+            <a:r>
+              <a:rPr lang="de-DE" dirty="0" err="1"/>
+              <a:t>the</a:t>
+            </a:r>
+            <a:r>
+              <a:rPr lang="de-DE" dirty="0"/>
+              <a:t> time </a:t>
+            </a:r>
+            <a:r>
+              <a:rPr lang="de-DE" dirty="0" err="1"/>
+              <a:t>you</a:t>
+            </a:r>
+            <a:r>
+              <a:rPr lang="de-DE" dirty="0"/>
+              <a:t> </a:t>
+            </a:r>
+            <a:r>
+              <a:rPr lang="de-DE" dirty="0" err="1"/>
+              <a:t>need</a:t>
+            </a:r>
+            <a:r>
+              <a:rPr lang="de-DE" dirty="0"/>
+              <a:t> </a:t>
+            </a:r>
+            <a:r>
+              <a:rPr lang="de-DE" dirty="0" err="1"/>
+              <a:t>the</a:t>
+            </a:r>
+            <a:r>
+              <a:rPr lang="de-DE" dirty="0"/>
+              <a:t> </a:t>
+            </a:r>
+            <a:r>
+              <a:rPr lang="de-DE" dirty="0" err="1"/>
+              <a:t>object</a:t>
+            </a:r>
+            <a:endParaRPr lang="de-DE" dirty="0"/>
+          </a:p>
+          <a:p>
+            <a:r>
+              <a:rPr lang="de-DE" dirty="0"/>
+              <a:t>Use </a:t>
+            </a:r>
+            <a:r>
+              <a:rPr lang="de-DE" dirty="0" err="1"/>
+              <a:t>cases</a:t>
+            </a:r>
+            <a:r>
+              <a:rPr lang="de-DE" dirty="0"/>
+              <a:t>:</a:t>
+            </a:r>
+          </a:p>
+          <a:p>
+            <a:pPr marL="800100" lvl="1" indent="-342900">
+              <a:buFont typeface="Arial" panose="020B0604020202020204" pitchFamily="34" charset="0"/>
+              <a:buChar char="•"/>
+            </a:pPr>
+            <a:r>
+              <a:rPr lang="de-DE" dirty="0"/>
+              <a:t>Caching (Remote Proxy)</a:t>
+            </a:r>
+          </a:p>
+          <a:p>
+            <a:pPr marL="1257300" lvl="2" indent="-342900">
+              <a:buFont typeface="Arial" panose="020B0604020202020204" pitchFamily="34" charset="0"/>
+              <a:buChar char="•"/>
+            </a:pPr>
+            <a:r>
+              <a:rPr lang="de-DE" dirty="0" err="1"/>
+              <a:t>Local</a:t>
+            </a:r>
+            <a:r>
+              <a:rPr lang="de-DE" dirty="0"/>
+              <a:t> </a:t>
+            </a:r>
+            <a:r>
+              <a:rPr lang="de-DE" dirty="0" err="1"/>
+              <a:t>objects</a:t>
+            </a:r>
+            <a:r>
+              <a:rPr lang="de-DE" dirty="0"/>
+              <a:t> </a:t>
+            </a:r>
+            <a:r>
+              <a:rPr lang="de-DE" dirty="0" err="1"/>
+              <a:t>representative</a:t>
+            </a:r>
+            <a:r>
+              <a:rPr lang="de-DE" dirty="0"/>
+              <a:t> </a:t>
+            </a:r>
+            <a:r>
+              <a:rPr lang="de-DE" dirty="0" err="1"/>
+              <a:t>for</a:t>
+            </a:r>
+            <a:r>
+              <a:rPr lang="de-DE" dirty="0"/>
+              <a:t> </a:t>
+            </a:r>
+            <a:r>
+              <a:rPr lang="de-DE" dirty="0" err="1"/>
+              <a:t>object</a:t>
+            </a:r>
+            <a:r>
+              <a:rPr lang="de-DE" dirty="0"/>
+              <a:t> in different </a:t>
+            </a:r>
+            <a:r>
+              <a:rPr lang="de-DE" dirty="0" err="1"/>
+              <a:t>adress</a:t>
+            </a:r>
+            <a:r>
+              <a:rPr lang="de-DE" dirty="0"/>
+              <a:t> </a:t>
+            </a:r>
+            <a:r>
+              <a:rPr lang="de-DE" dirty="0" err="1"/>
+              <a:t>space</a:t>
+            </a:r>
+            <a:endParaRPr lang="de-DE" dirty="0"/>
+          </a:p>
+          <a:p>
+            <a:pPr marL="800100" lvl="1" indent="-342900">
+              <a:buFont typeface="Arial" panose="020B0604020202020204" pitchFamily="34" charset="0"/>
+              <a:buChar char="•"/>
+            </a:pPr>
+            <a:r>
+              <a:rPr lang="de-DE" dirty="0"/>
+              <a:t>Substitute (Virtual Proxy)</a:t>
+            </a:r>
+          </a:p>
+          <a:p>
+            <a:pPr marL="1257300" lvl="2" indent="-342900">
+              <a:buFont typeface="Arial" panose="020B0604020202020204" pitchFamily="34" charset="0"/>
+              <a:buChar char="•"/>
+            </a:pPr>
+            <a:r>
+              <a:rPr lang="de-DE" dirty="0" err="1"/>
+              <a:t>Object</a:t>
+            </a:r>
+            <a:r>
+              <a:rPr lang="de-DE" dirty="0"/>
+              <a:t> </a:t>
+            </a:r>
+            <a:r>
+              <a:rPr lang="de-DE" dirty="0" err="1"/>
+              <a:t>is</a:t>
+            </a:r>
+            <a:r>
+              <a:rPr lang="de-DE" dirty="0"/>
+              <a:t> expensive </a:t>
+            </a:r>
+            <a:r>
+              <a:rPr lang="de-DE" dirty="0" err="1"/>
+              <a:t>to</a:t>
+            </a:r>
+            <a:r>
+              <a:rPr lang="de-DE" dirty="0"/>
+              <a:t> </a:t>
+            </a:r>
+            <a:r>
+              <a:rPr lang="de-DE" dirty="0" err="1"/>
+              <a:t>create</a:t>
+            </a:r>
+            <a:r>
+              <a:rPr lang="de-DE" dirty="0"/>
+              <a:t>/</a:t>
+            </a:r>
+            <a:r>
+              <a:rPr lang="de-DE" dirty="0" err="1"/>
+              <a:t>download</a:t>
+            </a:r>
+            <a:r>
+              <a:rPr lang="de-DE" dirty="0"/>
+              <a:t>, </a:t>
+            </a:r>
+            <a:r>
+              <a:rPr lang="de-DE" dirty="0" err="1"/>
+              <a:t>proxy</a:t>
+            </a:r>
+            <a:r>
+              <a:rPr lang="de-DE" dirty="0"/>
+              <a:t> </a:t>
+            </a:r>
+            <a:r>
+              <a:rPr lang="de-DE" dirty="0" err="1"/>
+              <a:t>acts</a:t>
+            </a:r>
+            <a:r>
+              <a:rPr lang="de-DE" dirty="0"/>
+              <a:t> </a:t>
+            </a:r>
+            <a:r>
+              <a:rPr lang="de-DE" dirty="0" err="1"/>
+              <a:t>as</a:t>
+            </a:r>
+            <a:r>
+              <a:rPr lang="de-DE" dirty="0"/>
+              <a:t> stand-in</a:t>
+            </a:r>
+          </a:p>
+          <a:p>
+            <a:pPr marL="800100" lvl="1" indent="-342900">
+              <a:buFont typeface="Arial" panose="020B0604020202020204" pitchFamily="34" charset="0"/>
+              <a:buChar char="•"/>
+            </a:pPr>
+            <a:r>
+              <a:rPr lang="de-DE" dirty="0"/>
+              <a:t>Access Control (</a:t>
+            </a:r>
+            <a:r>
+              <a:rPr lang="de-DE" dirty="0" err="1"/>
+              <a:t>Protection</a:t>
+            </a:r>
+            <a:r>
+              <a:rPr lang="de-DE" dirty="0"/>
+              <a:t> Proxy/Firewall)</a:t>
+            </a:r>
+          </a:p>
+          <a:p>
+            <a:pPr marL="1257300" lvl="2" indent="-342900">
+              <a:buFont typeface="Arial" panose="020B0604020202020204" pitchFamily="34" charset="0"/>
+              <a:buChar char="•"/>
+            </a:pPr>
+            <a:r>
+              <a:rPr lang="de-DE" dirty="0"/>
+              <a:t>Proxy </a:t>
+            </a:r>
+            <a:r>
+              <a:rPr lang="de-DE" dirty="0" err="1"/>
+              <a:t>object</a:t>
+            </a:r>
+            <a:r>
+              <a:rPr lang="de-DE" dirty="0"/>
+              <a:t> </a:t>
+            </a:r>
+            <a:r>
+              <a:rPr lang="de-DE" dirty="0" err="1"/>
+              <a:t>provides</a:t>
+            </a:r>
+            <a:r>
+              <a:rPr lang="de-DE" dirty="0"/>
+              <a:t> </a:t>
+            </a:r>
+            <a:r>
+              <a:rPr lang="de-DE" dirty="0" err="1"/>
+              <a:t>access</a:t>
+            </a:r>
+            <a:r>
+              <a:rPr lang="de-DE" dirty="0"/>
+              <a:t> </a:t>
+            </a:r>
+            <a:r>
+              <a:rPr lang="de-DE" dirty="0" err="1"/>
+              <a:t>control</a:t>
+            </a:r>
+            <a:r>
+              <a:rPr lang="de-DE" dirty="0"/>
+              <a:t> </a:t>
+            </a:r>
+            <a:r>
+              <a:rPr lang="de-DE" dirty="0" err="1"/>
+              <a:t>to</a:t>
+            </a:r>
+            <a:r>
+              <a:rPr lang="de-DE" dirty="0"/>
+              <a:t> </a:t>
+            </a:r>
+            <a:r>
+              <a:rPr lang="de-DE" dirty="0" err="1"/>
+              <a:t>the</a:t>
+            </a:r>
+            <a:r>
+              <a:rPr lang="de-DE" dirty="0"/>
+              <a:t> real </a:t>
+            </a:r>
+            <a:r>
+              <a:rPr lang="de-DE" dirty="0" err="1"/>
+              <a:t>object</a:t>
+            </a:r>
+            <a:endParaRPr lang="de-DE" dirty="0"/>
+          </a:p>
+          <a:p>
+            <a:pPr lvl="1"/>
+            <a:endParaRPr lang="de-DE" dirty="0"/>
+          </a:p>
+        </p:txBody>
+      </p:sp>
+      <p:sp>
+        <p:nvSpPr>
+          <p:cNvPr id="4" name="Datumsplatzhalter 3">
+            <a:extLst>
+              <a:ext uri="{FF2B5EF4-FFF2-40B4-BE49-F238E27FC236}">
+                <a16:creationId xmlns:a16="http://schemas.microsoft.com/office/drawing/2014/main" id="{9117B916-6F9A-427D-BD49-13A33563D2B7}"/>
+              </a:ext>
+            </a:extLst>
+          </p:cNvPr>
+          <p:cNvSpPr>
+            <a:spLocks noGrp="1"/>
+          </p:cNvSpPr>
+          <p:nvPr>
+            <p:ph type="dt" sz="half" idx="10"/>
+          </p:nvPr>
+        </p:nvSpPr>
+        <p:spPr/>
+        <p:txBody>
+          <a:bodyPr/>
+          <a:lstStyle/>
+          <a:p>
+            <a:pPr algn="ctr"/>
+            <a:r>
+              <a:rPr lang="de-DE"/>
+              <a:t>SS 2017</a:t>
+            </a:r>
+            <a:endParaRPr lang="en-US" dirty="0"/>
+          </a:p>
+        </p:txBody>
+      </p:sp>
+      <p:sp>
+        <p:nvSpPr>
+          <p:cNvPr id="5" name="Foliennummernplatzhalter 4">
+            <a:extLst>
+              <a:ext uri="{FF2B5EF4-FFF2-40B4-BE49-F238E27FC236}">
+                <a16:creationId xmlns:a16="http://schemas.microsoft.com/office/drawing/2014/main" id="{28CAB660-8BEE-4062-89CD-797460324506}"/>
+              </a:ext>
+            </a:extLst>
+          </p:cNvPr>
+          <p:cNvSpPr>
+            <a:spLocks noGrp="1"/>
+          </p:cNvSpPr>
+          <p:nvPr>
+            <p:ph type="sldNum" sz="quarter" idx="12"/>
+          </p:nvPr>
+        </p:nvSpPr>
+        <p:spPr/>
+        <p:txBody>
+          <a:bodyPr/>
+          <a:lstStyle/>
+          <a:p>
+            <a:fld id="{B169C2F2-EDB3-4FE6-84CD-3C84FADA21DC}" type="slidenum">
+              <a:rPr lang="en-US" smtClean="0"/>
+              <a:pPr/>
+              <a:t>8</a:t>
+            </a:fld>
+            <a:endParaRPr lang="en-US" dirty="0"/>
+          </a:p>
+        </p:txBody>
+      </p:sp>
+      <p:sp>
+        <p:nvSpPr>
+          <p:cNvPr id="6" name="Fußzeilenplatzhalter 5">
+            <a:extLst>
+              <a:ext uri="{FF2B5EF4-FFF2-40B4-BE49-F238E27FC236}">
+                <a16:creationId xmlns:a16="http://schemas.microsoft.com/office/drawing/2014/main" id="{EFA378EC-2989-4827-8C1F-547CF1D50D71}"/>
+              </a:ext>
+            </a:extLst>
+          </p:cNvPr>
+          <p:cNvSpPr>
+            <a:spLocks noGrp="1"/>
+          </p:cNvSpPr>
+          <p:nvPr>
+            <p:ph type="ftr" sz="quarter" idx="3"/>
+          </p:nvPr>
+        </p:nvSpPr>
+        <p:spPr/>
+        <p:txBody>
+          <a:bodyPr/>
+          <a:lstStyle/>
+          <a:p>
+            <a:r>
+              <a:rPr lang="en-US"/>
+              <a:t>Chapter / Lecture Title</a:t>
+            </a:r>
+            <a:endParaRPr lang="en-US" dirty="0"/>
+          </a:p>
+        </p:txBody>
+      </p:sp>
+    </p:spTree>
+    <p:extLst>
+      <p:ext uri="{BB962C8B-B14F-4D97-AF65-F5344CB8AC3E}">
+        <p14:creationId xmlns:p14="http://schemas.microsoft.com/office/powerpoint/2010/main" val="1607593233"/>
+      </p:ext>
+    </p:extLst>
+  </p:cSld>
+  <p:clrMapOvr>
+    <a:masterClrMapping/>
+  </p:clrMapOvr>
+</p:sld>
+</file>
+
+<file path=ppt/slides/slide9.xml><?xml version="1.0" encoding="utf-8"?>
+<p:sld xmlns:a="http://schemas.openxmlformats.org/drawingml/2006/main" xmlns:r="http://schemas.openxmlformats.org/officeDocument/2006/relationships" xmlns:p="http://schemas.openxmlformats.org/presentationml/2006/main">
+  <p:cSld>
+    <p:spTree>
+      <p:nvGrpSpPr>
+        <p:cNvPr id="1" name=""/>
+        <p:cNvGrpSpPr/>
+        <p:nvPr/>
+      </p:nvGrpSpPr>
+      <p:grpSpPr>
+        <a:xfrm>
+          <a:off x="0" y="0"/>
+          <a:ext cx="0" cy="0"/>
+          <a:chOff x="0" y="0"/>
+          <a:chExt cx="0" cy="0"/>
+        </a:xfrm>
+      </p:grpSpPr>
+      <p:sp>
+        <p:nvSpPr>
+          <p:cNvPr id="2" name="Titel 1">
+            <a:extLst>
+              <a:ext uri="{FF2B5EF4-FFF2-40B4-BE49-F238E27FC236}">
+                <a16:creationId xmlns:a16="http://schemas.microsoft.com/office/drawing/2014/main" id="{4F4BF4A3-307A-4348-B570-749ADCBD0071}"/>
+              </a:ext>
+            </a:extLst>
+          </p:cNvPr>
+          <p:cNvSpPr>
+            <a:spLocks noGrp="1"/>
+          </p:cNvSpPr>
+          <p:nvPr>
+            <p:ph type="title"/>
+          </p:nvPr>
+        </p:nvSpPr>
+        <p:spPr/>
+        <p:txBody>
+          <a:bodyPr/>
+          <a:lstStyle/>
+          <a:p>
+            <a:r>
+              <a:rPr lang="de-DE" dirty="0"/>
+              <a:t>Composite Pattern</a:t>
+            </a:r>
+          </a:p>
+        </p:txBody>
+      </p:sp>
+      <p:pic>
+        <p:nvPicPr>
+          <p:cNvPr id="10" name="Inhaltsplatzhalter 9">
+            <a:extLst>
+              <a:ext uri="{FF2B5EF4-FFF2-40B4-BE49-F238E27FC236}">
+                <a16:creationId xmlns:a16="http://schemas.microsoft.com/office/drawing/2014/main" id="{7EA3CB7E-E6FF-4D66-98EB-6FC63DF1BC6D}"/>
+              </a:ext>
+            </a:extLst>
+          </p:cNvPr>
+          <p:cNvPicPr>
+            <a:picLocks noGrp="1" noChangeAspect="1"/>
+          </p:cNvPicPr>
+          <p:nvPr>
+            <p:ph idx="1"/>
+          </p:nvPr>
+        </p:nvPicPr>
+        <p:blipFill>
+          <a:blip r:embed="rId2">
+            <a:extLst>
+              <a:ext uri="{28A0092B-C50C-407E-A947-70E740481C1C}">
+                <a14:useLocalDpi xmlns:a14="http://schemas.microsoft.com/office/drawing/2010/main" val="0"/>
+              </a:ext>
+            </a:extLst>
+          </a:blip>
+          <a:stretch>
+            <a:fillRect/>
+          </a:stretch>
+        </p:blipFill>
+        <p:spPr>
+          <a:xfrm>
+            <a:off x="1558413" y="1563871"/>
+            <a:ext cx="9075174" cy="4250624"/>
+          </a:xfrm>
+        </p:spPr>
+      </p:pic>
+      <p:sp>
+        <p:nvSpPr>
+          <p:cNvPr id="4" name="Datumsplatzhalter 3">
+            <a:extLst>
+              <a:ext uri="{FF2B5EF4-FFF2-40B4-BE49-F238E27FC236}">
+                <a16:creationId xmlns:a16="http://schemas.microsoft.com/office/drawing/2014/main" id="{2FFE2156-FF36-4D27-A572-A1F5E90FE8BD}"/>
+              </a:ext>
+            </a:extLst>
+          </p:cNvPr>
+          <p:cNvSpPr>
+            <a:spLocks noGrp="1"/>
+          </p:cNvSpPr>
+          <p:nvPr>
+            <p:ph type="dt" sz="half" idx="10"/>
+          </p:nvPr>
+        </p:nvSpPr>
+        <p:spPr/>
+        <p:txBody>
+          <a:bodyPr/>
+          <a:lstStyle/>
+          <a:p>
+            <a:pPr algn="ctr"/>
+            <a:r>
+              <a:rPr lang="de-DE"/>
+              <a:t>SS 2017</a:t>
+            </a:r>
+            <a:endParaRPr lang="en-US" dirty="0"/>
+          </a:p>
+        </p:txBody>
+      </p:sp>
+      <p:sp>
+        <p:nvSpPr>
+          <p:cNvPr id="5" name="Foliennummernplatzhalter 4">
+            <a:extLst>
+              <a:ext uri="{FF2B5EF4-FFF2-40B4-BE49-F238E27FC236}">
+                <a16:creationId xmlns:a16="http://schemas.microsoft.com/office/drawing/2014/main" id="{9DB531E2-C2D0-437F-9408-FEEA110F8FF6}"/>
+              </a:ext>
+            </a:extLst>
+          </p:cNvPr>
+          <p:cNvSpPr>
+            <a:spLocks noGrp="1"/>
+          </p:cNvSpPr>
+          <p:nvPr>
+            <p:ph type="sldNum" sz="quarter" idx="12"/>
+          </p:nvPr>
+        </p:nvSpPr>
+        <p:spPr/>
+        <p:txBody>
+          <a:bodyPr/>
+          <a:lstStyle/>
+          <a:p>
+            <a:fld id="{B169C2F2-EDB3-4FE6-84CD-3C84FADA21DC}" type="slidenum">
+              <a:rPr lang="en-US" smtClean="0"/>
+              <a:pPr/>
+              <a:t>9</a:t>
+            </a:fld>
+            <a:endParaRPr lang="en-US" dirty="0"/>
+          </a:p>
+        </p:txBody>
+      </p:sp>
+      <p:sp>
+        <p:nvSpPr>
+          <p:cNvPr id="6" name="Fußzeilenplatzhalter 5">
+            <a:extLst>
+              <a:ext uri="{FF2B5EF4-FFF2-40B4-BE49-F238E27FC236}">
+                <a16:creationId xmlns:a16="http://schemas.microsoft.com/office/drawing/2014/main" id="{B62B6635-2E0E-46FA-A7A1-B479B16DA7E8}"/>
+              </a:ext>
+            </a:extLst>
+          </p:cNvPr>
+          <p:cNvSpPr>
+            <a:spLocks noGrp="1"/>
+          </p:cNvSpPr>
+          <p:nvPr>
+            <p:ph type="ftr" sz="quarter" idx="3"/>
+          </p:nvPr>
+        </p:nvSpPr>
+        <p:spPr/>
+        <p:txBody>
+          <a:bodyPr/>
+          <a:lstStyle/>
+          <a:p>
+            <a:r>
+              <a:rPr lang="en-US"/>
+              <a:t>Chapter / Lecture Title</a:t>
+            </a:r>
+            <a:endParaRPr lang="en-US" dirty="0"/>
+          </a:p>
+        </p:txBody>
+      </p:sp>
+    </p:spTree>
+    <p:extLst>
+      <p:ext uri="{BB962C8B-B14F-4D97-AF65-F5344CB8AC3E}">
+        <p14:creationId xmlns:p14="http://schemas.microsoft.com/office/powerpoint/2010/main" val="3416714000"/>
       </p:ext>
     </p:extLst>
   </p:cSld>

</xml_diff>